<commit_message>
Actualizo presentacion power point
</commit_message>
<xml_diff>
--- a/Presentation Desafio1 Grupo3.pptx
+++ b/Presentation Desafio1 Grupo3.pptx
@@ -5,22 +5,27 @@
     <p:sldMasterId id="2147483648" r:id="rId1"/>
   </p:sldMasterIdLst>
   <p:notesMasterIdLst>
-    <p:notesMasterId r:id="rId12"/>
+    <p:notesMasterId r:id="rId17"/>
   </p:notesMasterIdLst>
   <p:handoutMasterIdLst>
-    <p:handoutMasterId r:id="rId13"/>
+    <p:handoutMasterId r:id="rId18"/>
   </p:handoutMasterIdLst>
   <p:sldIdLst>
     <p:sldId id="256" r:id="rId2"/>
     <p:sldId id="257" r:id="rId3"/>
     <p:sldId id="259" r:id="rId4"/>
     <p:sldId id="260" r:id="rId5"/>
-    <p:sldId id="258" r:id="rId6"/>
-    <p:sldId id="261" r:id="rId7"/>
-    <p:sldId id="262" r:id="rId8"/>
-    <p:sldId id="263" r:id="rId9"/>
-    <p:sldId id="264" r:id="rId10"/>
-    <p:sldId id="265" r:id="rId11"/>
+    <p:sldId id="270" r:id="rId6"/>
+    <p:sldId id="258" r:id="rId7"/>
+    <p:sldId id="269" r:id="rId8"/>
+    <p:sldId id="261" r:id="rId9"/>
+    <p:sldId id="262" r:id="rId10"/>
+    <p:sldId id="263" r:id="rId11"/>
+    <p:sldId id="264" r:id="rId12"/>
+    <p:sldId id="265" r:id="rId13"/>
+    <p:sldId id="268" r:id="rId14"/>
+    <p:sldId id="267" r:id="rId15"/>
+    <p:sldId id="266" r:id="rId16"/>
   </p:sldIdLst>
   <p:sldSz cx="12192000" cy="6858000"/>
   <p:notesSz cx="6858000" cy="9144000"/>
@@ -130,6 +135,14 @@
 </p:presentation>
 </file>
 
+<file path=ppt/revisionInfo.xml><?xml version="1.0" encoding="utf-8"?>
+<p1510:revInfo xmlns:a="http://schemas.openxmlformats.org/drawingml/2006/main" xmlns:r="http://schemas.openxmlformats.org/officeDocument/2006/relationships" xmlns:p1510="http://schemas.microsoft.com/office/powerpoint/2015/10/main">
+  <p1510:revLst>
+    <p1510:client id="{89C9AFCE-83D6-4898-9BF9-A6BF62B5DD3D}" v="2441" dt="2020-03-31T16:08:28.546"/>
+  </p1510:revLst>
+</p1510:revInfo>
+</file>
+
 <file path=ppt/handoutMasters/handoutMaster1.xml><?xml version="1.0" encoding="utf-8"?>
 <p:handoutMaster xmlns:a="http://schemas.openxmlformats.org/drawingml/2006/main" xmlns:r="http://schemas.openxmlformats.org/officeDocument/2006/relationships" xmlns:p="http://schemas.openxmlformats.org/presentationml/2006/main">
   <p:cSld>
@@ -338,7 +351,7 @@
           <a:p>
             <a:fld id="{68B765BA-1B93-4799-BEE1-FEFAC354A1BE}" type="datetimeFigureOut">
               <a:rPr lang="en-US" smtClean="0"/>
-              <a:t>30-Mar-20</a:t>
+              <a:t>3/31/2020</a:t>
             </a:fld>
             <a:endParaRPr lang="en-US"/>
           </a:p>
@@ -402,38 +415,37 @@
           <a:p>
             <a:pPr lvl="0"/>
             <a:r>
-              <a:rPr lang="en-US" smtClean="0"/>
+              <a:rPr lang="en-US"/>
               <a:t>Click to edit Master text styles</a:t>
             </a:r>
           </a:p>
           <a:p>
             <a:pPr lvl="1"/>
             <a:r>
-              <a:rPr lang="en-US" smtClean="0"/>
+              <a:rPr lang="en-US"/>
               <a:t>Second level</a:t>
             </a:r>
           </a:p>
           <a:p>
             <a:pPr lvl="2"/>
             <a:r>
-              <a:rPr lang="en-US" smtClean="0"/>
+              <a:rPr lang="en-US"/>
               <a:t>Third level</a:t>
             </a:r>
           </a:p>
           <a:p>
             <a:pPr lvl="3"/>
             <a:r>
-              <a:rPr lang="en-US" smtClean="0"/>
+              <a:rPr lang="en-US"/>
               <a:t>Fourth level</a:t>
             </a:r>
           </a:p>
           <a:p>
             <a:pPr lvl="4"/>
             <a:r>
-              <a:rPr lang="en-US" smtClean="0"/>
+              <a:rPr lang="en-US"/>
               <a:t>Fifth level</a:t>
             </a:r>
-            <a:endParaRPr lang="en-US"/>
           </a:p>
         </p:txBody>
       </p:sp>
@@ -497,7 +509,7 @@
           <a:p>
             <a:fld id="{BD3DDE2A-55BB-43ED-ADC3-CC59B3C93D4B}" type="slidenum">
               <a:rPr lang="en-US" smtClean="0"/>
-              <a:t>‹#›</a:t>
+              <a:t>‹Nº›</a:t>
             </a:fld>
             <a:endParaRPr lang="en-US"/>
           </a:p>
@@ -722,7 +734,7 @@
           </a:lstStyle>
           <a:p>
             <a:r>
-              <a:rPr lang="es-AR" dirty="0" smtClean="0"/>
+              <a:rPr lang="es-AR" dirty="0"/>
               <a:t>Desafío 1 – Grupo 3</a:t>
             </a:r>
             <a:endParaRPr lang="en-US" dirty="0"/>
@@ -779,7 +791,7 @@
           <a:p>
             <a:fld id="{4FD5F03F-295F-4FEE-8784-F483B212F7CF}" type="datetimeFigureOut">
               <a:rPr lang="en-US" smtClean="0"/>
-              <a:t>30-Mar-20</a:t>
+              <a:t>3/31/2020</a:t>
             </a:fld>
             <a:endParaRPr lang="en-US"/>
           </a:p>
@@ -821,7 +833,7 @@
           <a:p>
             <a:fld id="{09706822-C680-4018-BB08-712CCD4C2A81}" type="slidenum">
               <a:rPr lang="en-US" smtClean="0"/>
-              <a:t>‹#›</a:t>
+              <a:t>‹Nº›</a:t>
             </a:fld>
             <a:endParaRPr lang="en-US"/>
           </a:p>
@@ -885,10 +897,9 @@
           </a:lstStyle>
           <a:p>
             <a:r>
-              <a:rPr lang="en-US" dirty="0" smtClean="0"/>
+              <a:rPr lang="en-US" dirty="0"/>
               <a:t>Click to edit Master title style</a:t>
             </a:r>
-            <a:endParaRPr lang="en-US" dirty="0"/>
           </a:p>
         </p:txBody>
       </p:sp>
@@ -953,10 +964,9 @@
           </a:lstStyle>
           <a:p>
             <a:r>
-              <a:rPr lang="en-US" smtClean="0"/>
+              <a:rPr lang="en-US"/>
               <a:t>Click to edit Master subtitle style</a:t>
             </a:r>
-            <a:endParaRPr lang="en-US"/>
           </a:p>
         </p:txBody>
       </p:sp>
@@ -977,7 +987,7 @@
           <a:p>
             <a:fld id="{4FD5F03F-295F-4FEE-8784-F483B212F7CF}" type="datetimeFigureOut">
               <a:rPr lang="en-US" smtClean="0"/>
-              <a:t>30-Mar-20</a:t>
+              <a:t>3/31/2020</a:t>
             </a:fld>
             <a:endParaRPr lang="en-US"/>
           </a:p>
@@ -1019,7 +1029,7 @@
           <a:p>
             <a:fld id="{09706822-C680-4018-BB08-712CCD4C2A81}" type="slidenum">
               <a:rPr lang="en-US" smtClean="0"/>
-              <a:t>‹#›</a:t>
+              <a:t>‹Nº›</a:t>
             </a:fld>
             <a:endParaRPr lang="en-US"/>
           </a:p>
@@ -1105,7 +1115,7 @@
           <a:p>
             <a:fld id="{4FD5F03F-295F-4FEE-8784-F483B212F7CF}" type="datetimeFigureOut">
               <a:rPr lang="en-US" smtClean="0"/>
-              <a:t>30-Mar-20</a:t>
+              <a:t>3/31/2020</a:t>
             </a:fld>
             <a:endParaRPr lang="en-US"/>
           </a:p>
@@ -1183,7 +1193,7 @@
           <a:p>
             <a:fld id="{09706822-C680-4018-BB08-712CCD4C2A81}" type="slidenum">
               <a:rPr lang="en-US" smtClean="0"/>
-              <a:t>‹#›</a:t>
+              <a:t>‹Nº›</a:t>
             </a:fld>
             <a:endParaRPr lang="en-US"/>
           </a:p>
@@ -1643,7 +1653,7 @@
           <a:lstStyle/>
           <a:p>
             <a:r>
-              <a:rPr lang="es-AR" sz="8000" dirty="0" smtClean="0">
+              <a:rPr lang="es-AR" sz="8000" dirty="0">
                 <a:latin typeface="Bookman Old Style" panose="02050604050505020204" pitchFamily="18" charset="0"/>
                 <a:cs typeface="Arial" panose="020B0604020202020204" pitchFamily="34" charset="0"/>
               </a:rPr>
@@ -1653,7 +1663,7 @@
           <a:p>
             <a:pPr algn="ctr"/>
             <a:r>
-              <a:rPr lang="es-AR" sz="8000" dirty="0" smtClean="0">
+              <a:rPr lang="es-AR" sz="8000" dirty="0">
                 <a:latin typeface="Bookman Old Style" panose="02050604050505020204" pitchFamily="18" charset="0"/>
                 <a:cs typeface="Arial" panose="020B0604020202020204" pitchFamily="34" charset="0"/>
               </a:rPr>
@@ -1676,13 +1686,6 @@
   <p:clrMapOvr>
     <a:masterClrMapping/>
   </p:clrMapOvr>
-  <p:timing>
-    <p:tnLst>
-      <p:par>
-        <p:cTn id="1" dur="indefinite" restart="never" nodeType="tmRoot"/>
-      </p:par>
-    </p:tnLst>
-  </p:timing>
 </p:sld>
 </file>
 
@@ -1734,10 +1737,1285 @@
         </p:nvSpPr>
         <p:spPr/>
         <p:txBody>
+          <a:bodyPr anchor="t"/>
+          <a:lstStyle/>
+          <a:p>
+            <a:r>
+              <a:rPr lang="en-US" dirty="0">
+                <a:ea typeface="+mn-lt"/>
+                <a:cs typeface="+mn-lt"/>
+              </a:rPr>
+              <a:t>¿</a:t>
+            </a:r>
+            <a:r>
+              <a:rPr lang="en-US" dirty="0" err="1">
+                <a:ea typeface="+mn-lt"/>
+                <a:cs typeface="+mn-lt"/>
+              </a:rPr>
+              <a:t>Cómo</a:t>
+            </a:r>
+            <a:r>
+              <a:rPr lang="en-US" dirty="0">
+                <a:ea typeface="+mn-lt"/>
+                <a:cs typeface="+mn-lt"/>
+              </a:rPr>
+              <a:t> </a:t>
+            </a:r>
+            <a:r>
+              <a:rPr lang="en-US" dirty="0" err="1">
+                <a:ea typeface="+mn-lt"/>
+                <a:cs typeface="+mn-lt"/>
+              </a:rPr>
+              <a:t>completar</a:t>
+            </a:r>
+            <a:r>
+              <a:rPr lang="en-US" dirty="0">
+                <a:ea typeface="+mn-lt"/>
+                <a:cs typeface="+mn-lt"/>
+              </a:rPr>
+              <a:t> los </a:t>
+            </a:r>
+            <a:r>
+              <a:rPr lang="en-US" dirty="0" err="1">
+                <a:ea typeface="+mn-lt"/>
+                <a:cs typeface="+mn-lt"/>
+              </a:rPr>
+              <a:t>valores</a:t>
+            </a:r>
+            <a:r>
+              <a:rPr lang="en-US" dirty="0">
+                <a:ea typeface="+mn-lt"/>
+                <a:cs typeface="+mn-lt"/>
+              </a:rPr>
+              <a:t> </a:t>
+            </a:r>
+            <a:r>
+              <a:rPr lang="en-US" dirty="0" err="1">
+                <a:ea typeface="+mn-lt"/>
+                <a:cs typeface="+mn-lt"/>
+              </a:rPr>
+              <a:t>faltantes</a:t>
+            </a:r>
+            <a:r>
+              <a:rPr lang="en-US" dirty="0">
+                <a:ea typeface="+mn-lt"/>
+                <a:cs typeface="+mn-lt"/>
+              </a:rPr>
+              <a:t>?</a:t>
+            </a:r>
+            <a:endParaRPr lang="es-ES" dirty="0">
+              <a:ea typeface="+mn-lt"/>
+              <a:cs typeface="+mn-lt"/>
+            </a:endParaRPr>
+          </a:p>
+          <a:p>
+            <a:endParaRPr lang="en-US" dirty="0">
+              <a:cs typeface="Calibri"/>
+            </a:endParaRPr>
+          </a:p>
+          <a:p>
+            <a:r>
+              <a:rPr lang="en-US" dirty="0" err="1">
+                <a:cs typeface="Calibri"/>
+              </a:rPr>
+              <a:t>Relacionando</a:t>
+            </a:r>
+            <a:r>
+              <a:rPr lang="en-US" dirty="0">
+                <a:cs typeface="Calibri"/>
+              </a:rPr>
+              <a:t> </a:t>
+            </a:r>
+            <a:r>
+              <a:rPr lang="en-US" dirty="0" err="1">
+                <a:cs typeface="Calibri"/>
+              </a:rPr>
+              <a:t>datos</a:t>
+            </a:r>
+            <a:r>
+              <a:rPr lang="en-US" dirty="0">
+                <a:cs typeface="Calibri"/>
+              </a:rPr>
+              <a:t> por </a:t>
+            </a:r>
+            <a:r>
+              <a:rPr lang="en-US" dirty="0" err="1">
+                <a:cs typeface="Calibri"/>
+              </a:rPr>
+              <a:t>su</a:t>
+            </a:r>
+            <a:r>
+              <a:rPr lang="en-US" dirty="0">
+                <a:cs typeface="Calibri"/>
+              </a:rPr>
+              <a:t> </a:t>
+            </a:r>
+            <a:r>
+              <a:rPr lang="en-US" dirty="0" err="1">
+                <a:cs typeface="Calibri"/>
+              </a:rPr>
+              <a:t>nombre</a:t>
+            </a:r>
+            <a:endParaRPr lang="en-US">
+              <a:cs typeface="Calibri"/>
+            </a:endParaRPr>
+          </a:p>
+          <a:p>
+            <a:endParaRPr lang="en-US" dirty="0">
+              <a:cs typeface="Calibri"/>
+            </a:endParaRPr>
+          </a:p>
+          <a:p>
+            <a:r>
+              <a:rPr lang="en-US" dirty="0">
+                <a:cs typeface="Calibri"/>
+              </a:rPr>
+              <a:t>En la </a:t>
+            </a:r>
+            <a:r>
+              <a:rPr lang="en-US" dirty="0" err="1">
+                <a:cs typeface="Calibri"/>
+              </a:rPr>
+              <a:t>mayoría</a:t>
+            </a:r>
+            <a:r>
+              <a:rPr lang="en-US" dirty="0">
+                <a:cs typeface="Calibri"/>
+              </a:rPr>
+              <a:t> de </a:t>
+            </a:r>
+            <a:r>
+              <a:rPr lang="en-US" dirty="0" err="1">
+                <a:cs typeface="Calibri"/>
+              </a:rPr>
+              <a:t>estos</a:t>
+            </a:r>
+            <a:r>
+              <a:rPr lang="en-US" dirty="0">
+                <a:cs typeface="Calibri"/>
+              </a:rPr>
+              <a:t> </a:t>
+            </a:r>
+            <a:r>
+              <a:rPr lang="en-US" dirty="0" err="1">
+                <a:cs typeface="Calibri"/>
+              </a:rPr>
+              <a:t>casos</a:t>
+            </a:r>
+            <a:r>
+              <a:rPr lang="en-US" dirty="0">
+                <a:cs typeface="Calibri"/>
+              </a:rPr>
+              <a:t>, la </a:t>
+            </a:r>
+            <a:r>
+              <a:rPr lang="en-US" dirty="0" err="1">
+                <a:cs typeface="Calibri"/>
+              </a:rPr>
+              <a:t>relación</a:t>
+            </a:r>
+            <a:r>
+              <a:rPr lang="en-US" dirty="0">
+                <a:cs typeface="Calibri"/>
+              </a:rPr>
+              <a:t> se </a:t>
+            </a:r>
+            <a:r>
+              <a:rPr lang="en-US" dirty="0" err="1">
+                <a:cs typeface="Calibri"/>
+              </a:rPr>
+              <a:t>daba</a:t>
+            </a:r>
+            <a:r>
+              <a:rPr lang="en-US" dirty="0">
+                <a:cs typeface="Calibri"/>
+              </a:rPr>
+              <a:t> por una </a:t>
+            </a:r>
+            <a:r>
+              <a:rPr lang="en-US" dirty="0" err="1">
+                <a:cs typeface="Calibri"/>
+              </a:rPr>
+              <a:t>cuenta</a:t>
+            </a:r>
+            <a:r>
+              <a:rPr lang="en-US" dirty="0">
+                <a:cs typeface="Calibri"/>
+              </a:rPr>
+              <a:t> </a:t>
+            </a:r>
+            <a:r>
+              <a:rPr lang="en-US" dirty="0" err="1">
+                <a:cs typeface="Calibri"/>
+              </a:rPr>
+              <a:t>matemática</a:t>
+            </a:r>
+            <a:r>
+              <a:rPr lang="en-US" dirty="0">
+                <a:cs typeface="Calibri"/>
+              </a:rPr>
+              <a:t>, en la </a:t>
+            </a:r>
+            <a:r>
+              <a:rPr lang="en-US" dirty="0" err="1">
+                <a:cs typeface="Calibri"/>
+              </a:rPr>
+              <a:t>cuál</a:t>
+            </a:r>
+            <a:r>
+              <a:rPr lang="en-US" dirty="0">
+                <a:cs typeface="Calibri"/>
+              </a:rPr>
+              <a:t> a </a:t>
+            </a:r>
+            <a:r>
+              <a:rPr lang="en-US" dirty="0" err="1">
+                <a:cs typeface="Calibri"/>
+              </a:rPr>
+              <a:t>partir</a:t>
+            </a:r>
+            <a:r>
+              <a:rPr lang="en-US" dirty="0">
+                <a:cs typeface="Calibri"/>
+              </a:rPr>
+              <a:t> de dos </a:t>
+            </a:r>
+            <a:r>
+              <a:rPr lang="en-US" dirty="0" err="1">
+                <a:cs typeface="Calibri"/>
+              </a:rPr>
+              <a:t>datos</a:t>
+            </a:r>
+            <a:r>
+              <a:rPr lang="en-US" dirty="0">
+                <a:cs typeface="Calibri"/>
+              </a:rPr>
+              <a:t> se </a:t>
+            </a:r>
+            <a:r>
+              <a:rPr lang="en-US" dirty="0" err="1">
+                <a:cs typeface="Calibri"/>
+              </a:rPr>
+              <a:t>obtenía</a:t>
+            </a:r>
+            <a:r>
+              <a:rPr lang="en-US" dirty="0">
+                <a:cs typeface="Calibri"/>
+              </a:rPr>
+              <a:t> un </a:t>
+            </a:r>
+            <a:r>
+              <a:rPr lang="en-US" dirty="0" err="1">
+                <a:cs typeface="Calibri"/>
+              </a:rPr>
+              <a:t>tercero</a:t>
+            </a:r>
+            <a:r>
+              <a:rPr lang="en-US" dirty="0">
+                <a:cs typeface="Calibri"/>
+              </a:rPr>
+              <a:t>.</a:t>
+            </a:r>
+          </a:p>
+          <a:p>
+            <a:r>
+              <a:rPr lang="en-US" dirty="0">
+                <a:cs typeface="Calibri"/>
+              </a:rPr>
+              <a:t>Por </a:t>
+            </a:r>
+            <a:r>
+              <a:rPr lang="en-US" dirty="0" err="1">
+                <a:cs typeface="Calibri"/>
+              </a:rPr>
+              <a:t>ej</a:t>
+            </a:r>
+            <a:r>
+              <a:rPr lang="en-US" dirty="0">
+                <a:cs typeface="Calibri"/>
+              </a:rPr>
+              <a:t>: </a:t>
+            </a:r>
+            <a:r>
+              <a:rPr lang="en-US" sz="2000" dirty="0">
+                <a:latin typeface="Consolas"/>
+                <a:cs typeface="Calibri"/>
+              </a:rPr>
+              <a:t>price_usd_per_m2 * surface_total_in_m2 = </a:t>
+            </a:r>
+            <a:r>
+              <a:rPr lang="en-US" sz="2000" dirty="0" err="1">
+                <a:latin typeface="Consolas"/>
+                <a:cs typeface="Calibri"/>
+              </a:rPr>
+              <a:t>price_aprox_usd</a:t>
+            </a:r>
+          </a:p>
+          <a:p>
+            <a:r>
+              <a:rPr lang="en-US" dirty="0" err="1">
+                <a:latin typeface="Calibri"/>
+                <a:cs typeface="Calibri"/>
+              </a:rPr>
+              <a:t>Algunos</a:t>
+            </a:r>
+            <a:r>
+              <a:rPr lang="en-US" dirty="0">
+                <a:latin typeface="Calibri"/>
+                <a:cs typeface="Calibri"/>
+              </a:rPr>
+              <a:t> </a:t>
+            </a:r>
+            <a:r>
+              <a:rPr lang="en-US" dirty="0" err="1">
+                <a:latin typeface="Calibri"/>
+                <a:cs typeface="Calibri"/>
+              </a:rPr>
+              <a:t>datos</a:t>
+            </a:r>
+            <a:r>
+              <a:rPr lang="en-US" dirty="0">
+                <a:latin typeface="Calibri"/>
+                <a:cs typeface="Calibri"/>
+              </a:rPr>
+              <a:t> </a:t>
+            </a:r>
+            <a:r>
+              <a:rPr lang="en-US" dirty="0" err="1">
+                <a:latin typeface="Calibri"/>
+                <a:cs typeface="Calibri"/>
+              </a:rPr>
+              <a:t>eran</a:t>
+            </a:r>
+            <a:r>
+              <a:rPr lang="en-US" dirty="0">
+                <a:latin typeface="Calibri"/>
+                <a:cs typeface="Calibri"/>
+              </a:rPr>
+              <a:t> la </a:t>
+            </a:r>
+            <a:r>
+              <a:rPr lang="en-US" dirty="0" err="1">
+                <a:latin typeface="Calibri"/>
+                <a:cs typeface="Calibri"/>
+              </a:rPr>
+              <a:t>unión</a:t>
+            </a:r>
+            <a:r>
+              <a:rPr lang="en-US" dirty="0">
+                <a:latin typeface="Calibri"/>
+                <a:cs typeface="Calibri"/>
+              </a:rPr>
+              <a:t> de </a:t>
+            </a:r>
+            <a:r>
+              <a:rPr lang="en-US" dirty="0" err="1">
+                <a:latin typeface="Calibri"/>
+                <a:cs typeface="Calibri"/>
+              </a:rPr>
+              <a:t>otros</a:t>
+            </a:r>
+            <a:r>
+              <a:rPr lang="en-US" dirty="0">
+                <a:latin typeface="Calibri"/>
+                <a:cs typeface="Calibri"/>
+              </a:rPr>
+              <a:t>, al </a:t>
+            </a:r>
+            <a:r>
+              <a:rPr lang="en-US" dirty="0" err="1">
+                <a:latin typeface="Calibri"/>
+                <a:cs typeface="Calibri"/>
+              </a:rPr>
+              <a:t>desagregar</a:t>
+            </a:r>
+            <a:r>
+              <a:rPr lang="en-US" dirty="0">
+                <a:latin typeface="Calibri"/>
+                <a:cs typeface="Calibri"/>
+              </a:rPr>
+              <a:t> los </a:t>
+            </a:r>
+            <a:r>
+              <a:rPr lang="en-US" dirty="0" err="1">
+                <a:latin typeface="Calibri"/>
+                <a:cs typeface="Calibri"/>
+              </a:rPr>
+              <a:t>primeros</a:t>
+            </a:r>
+            <a:r>
+              <a:rPr lang="en-US" dirty="0">
+                <a:latin typeface="Calibri"/>
+                <a:cs typeface="Calibri"/>
+              </a:rPr>
+              <a:t> </a:t>
+            </a:r>
+            <a:r>
+              <a:rPr lang="en-US" dirty="0" err="1">
+                <a:latin typeface="Calibri"/>
+                <a:cs typeface="Calibri"/>
+              </a:rPr>
+              <a:t>pudimos</a:t>
+            </a:r>
+            <a:r>
+              <a:rPr lang="en-US" dirty="0">
+                <a:latin typeface="Calibri"/>
+                <a:cs typeface="Calibri"/>
+              </a:rPr>
+              <a:t> </a:t>
+            </a:r>
+            <a:r>
+              <a:rPr lang="en-US" dirty="0" err="1">
+                <a:latin typeface="Calibri"/>
+                <a:cs typeface="Calibri"/>
+              </a:rPr>
+              <a:t>obtener</a:t>
+            </a:r>
+            <a:r>
+              <a:rPr lang="en-US" dirty="0">
+                <a:latin typeface="Calibri"/>
+                <a:cs typeface="Calibri"/>
+              </a:rPr>
+              <a:t> los </a:t>
+            </a:r>
+            <a:r>
+              <a:rPr lang="en-US" dirty="0" err="1">
+                <a:latin typeface="Calibri"/>
+                <a:cs typeface="Calibri"/>
+              </a:rPr>
+              <a:t>derivados</a:t>
+            </a:r>
+            <a:endParaRPr lang="en-US" dirty="0">
+              <a:latin typeface="Calibri"/>
+              <a:cs typeface="Calibri"/>
+            </a:endParaRPr>
+          </a:p>
+        </p:txBody>
+      </p:sp>
+    </p:spTree>
+    <p:extLst>
+      <p:ext uri="{BB962C8B-B14F-4D97-AF65-F5344CB8AC3E}">
+        <p14:creationId xmlns:p14="http://schemas.microsoft.com/office/powerpoint/2010/main" val="2244995768"/>
+      </p:ext>
+    </p:extLst>
+  </p:cSld>
+  <p:clrMapOvr>
+    <a:masterClrMapping/>
+  </p:clrMapOvr>
+</p:sld>
+</file>
+
+<file path=ppt/slides/slide11.xml><?xml version="1.0" encoding="utf-8"?>
+<p:sld xmlns:a="http://schemas.openxmlformats.org/drawingml/2006/main" xmlns:r="http://schemas.openxmlformats.org/officeDocument/2006/relationships" xmlns:p="http://schemas.openxmlformats.org/presentationml/2006/main">
+  <p:cSld>
+    <p:spTree>
+      <p:nvGrpSpPr>
+        <p:cNvPr id="1" name=""/>
+        <p:cNvGrpSpPr/>
+        <p:nvPr/>
+      </p:nvGrpSpPr>
+      <p:grpSpPr>
+        <a:xfrm>
+          <a:off x="0" y="0"/>
+          <a:ext cx="0" cy="0"/>
+          <a:chOff x="0" y="0"/>
+          <a:chExt cx="0" cy="0"/>
+        </a:xfrm>
+      </p:grpSpPr>
+      <p:sp>
+        <p:nvSpPr>
+          <p:cNvPr id="2" name="Title 1"/>
+          <p:cNvSpPr>
+            <a:spLocks noGrp="1"/>
+          </p:cNvSpPr>
+          <p:nvPr>
+            <p:ph type="title"/>
+          </p:nvPr>
+        </p:nvSpPr>
+        <p:spPr/>
+        <p:txBody>
           <a:bodyPr/>
           <a:lstStyle/>
           <a:p>
             <a:endParaRPr lang="en-US"/>
+          </a:p>
+        </p:txBody>
+      </p:sp>
+      <p:sp>
+        <p:nvSpPr>
+          <p:cNvPr id="3" name="Content Placeholder 2"/>
+          <p:cNvSpPr>
+            <a:spLocks noGrp="1"/>
+          </p:cNvSpPr>
+          <p:nvPr>
+            <p:ph idx="1"/>
+          </p:nvPr>
+        </p:nvSpPr>
+        <p:spPr/>
+        <p:txBody>
+          <a:bodyPr anchor="t"/>
+          <a:lstStyle/>
+          <a:p>
+            <a:r>
+              <a:rPr lang="en-US" dirty="0">
+                <a:ea typeface="+mn-lt"/>
+                <a:cs typeface="+mn-lt"/>
+              </a:rPr>
+              <a:t>¿</a:t>
+            </a:r>
+            <a:r>
+              <a:rPr lang="en-US" dirty="0" err="1">
+                <a:ea typeface="+mn-lt"/>
+                <a:cs typeface="+mn-lt"/>
+              </a:rPr>
+              <a:t>Cómo</a:t>
+            </a:r>
+            <a:r>
+              <a:rPr lang="en-US" dirty="0">
+                <a:ea typeface="+mn-lt"/>
+                <a:cs typeface="+mn-lt"/>
+              </a:rPr>
+              <a:t> </a:t>
+            </a:r>
+            <a:r>
+              <a:rPr lang="en-US" dirty="0" err="1">
+                <a:ea typeface="+mn-lt"/>
+                <a:cs typeface="+mn-lt"/>
+              </a:rPr>
+              <a:t>completar</a:t>
+            </a:r>
+            <a:r>
+              <a:rPr lang="en-US" dirty="0">
+                <a:ea typeface="+mn-lt"/>
+                <a:cs typeface="+mn-lt"/>
+              </a:rPr>
+              <a:t> los </a:t>
+            </a:r>
+            <a:r>
+              <a:rPr lang="en-US" dirty="0" err="1">
+                <a:ea typeface="+mn-lt"/>
+                <a:cs typeface="+mn-lt"/>
+              </a:rPr>
+              <a:t>valores</a:t>
+            </a:r>
+            <a:r>
+              <a:rPr lang="en-US" dirty="0">
+                <a:ea typeface="+mn-lt"/>
+                <a:cs typeface="+mn-lt"/>
+              </a:rPr>
+              <a:t> </a:t>
+            </a:r>
+            <a:r>
+              <a:rPr lang="en-US" dirty="0" err="1">
+                <a:ea typeface="+mn-lt"/>
+                <a:cs typeface="+mn-lt"/>
+              </a:rPr>
+              <a:t>faltantes</a:t>
+            </a:r>
+            <a:r>
+              <a:rPr lang="en-US" dirty="0">
+                <a:ea typeface="+mn-lt"/>
+                <a:cs typeface="+mn-lt"/>
+              </a:rPr>
+              <a:t>?</a:t>
+            </a:r>
+          </a:p>
+          <a:p>
+            <a:endParaRPr lang="en-US" dirty="0">
+              <a:cs typeface="Calibri"/>
+            </a:endParaRPr>
+          </a:p>
+          <a:p>
+            <a:r>
+              <a:rPr lang="en-US" dirty="0" err="1">
+                <a:cs typeface="Calibri"/>
+              </a:rPr>
+              <a:t>Obtener</a:t>
+            </a:r>
+            <a:r>
+              <a:rPr lang="en-US" dirty="0">
+                <a:cs typeface="Calibri"/>
+              </a:rPr>
+              <a:t> </a:t>
+            </a:r>
+            <a:r>
+              <a:rPr lang="en-US" dirty="0" err="1">
+                <a:cs typeface="Calibri"/>
+              </a:rPr>
+              <a:t>datos</a:t>
+            </a:r>
+            <a:r>
+              <a:rPr lang="en-US" dirty="0">
+                <a:cs typeface="Calibri"/>
+              </a:rPr>
+              <a:t> a </a:t>
+            </a:r>
+            <a:r>
+              <a:rPr lang="en-US" dirty="0" err="1">
+                <a:cs typeface="Calibri"/>
+              </a:rPr>
+              <a:t>partir</a:t>
+            </a:r>
+            <a:r>
+              <a:rPr lang="en-US" dirty="0">
+                <a:cs typeface="Calibri"/>
+              </a:rPr>
+              <a:t> de la </a:t>
+            </a:r>
+            <a:r>
+              <a:rPr lang="en-US" dirty="0" err="1">
+                <a:cs typeface="Calibri"/>
+              </a:rPr>
+              <a:t>columna</a:t>
+            </a:r>
+            <a:r>
+              <a:rPr lang="en-US" dirty="0">
+                <a:cs typeface="Calibri"/>
+              </a:rPr>
+              <a:t> description</a:t>
+            </a:r>
+          </a:p>
+          <a:p>
+            <a:endParaRPr lang="en-US" dirty="0">
+              <a:cs typeface="Calibri"/>
+            </a:endParaRPr>
+          </a:p>
+          <a:p>
+            <a:r>
+              <a:rPr lang="en-US" dirty="0">
+                <a:cs typeface="Calibri"/>
+              </a:rPr>
+              <a:t>En </a:t>
+            </a:r>
+            <a:r>
+              <a:rPr lang="en-US" dirty="0" err="1">
+                <a:cs typeface="Calibri"/>
+              </a:rPr>
+              <a:t>dicha</a:t>
+            </a:r>
+            <a:r>
+              <a:rPr lang="en-US" dirty="0">
+                <a:cs typeface="Calibri"/>
+              </a:rPr>
+              <a:t> </a:t>
+            </a:r>
+            <a:r>
+              <a:rPr lang="en-US" dirty="0" err="1">
+                <a:cs typeface="Calibri"/>
+              </a:rPr>
+              <a:t>columna</a:t>
+            </a:r>
+            <a:r>
+              <a:rPr lang="en-US" dirty="0">
+                <a:cs typeface="Calibri"/>
+              </a:rPr>
+              <a:t> hay </a:t>
+            </a:r>
+            <a:r>
+              <a:rPr lang="en-US" dirty="0" err="1">
+                <a:cs typeface="Calibri"/>
+              </a:rPr>
+              <a:t>información</a:t>
+            </a:r>
+            <a:r>
+              <a:rPr lang="en-US" dirty="0">
+                <a:cs typeface="Calibri"/>
+              </a:rPr>
+              <a:t> general </a:t>
+            </a:r>
+            <a:r>
+              <a:rPr lang="en-US" dirty="0" err="1">
+                <a:cs typeface="Calibri"/>
+              </a:rPr>
+              <a:t>sobre</a:t>
+            </a:r>
+            <a:r>
+              <a:rPr lang="en-US" dirty="0">
+                <a:cs typeface="Calibri"/>
+              </a:rPr>
+              <a:t> la </a:t>
+            </a:r>
+            <a:r>
+              <a:rPr lang="en-US" dirty="0" err="1">
+                <a:cs typeface="Calibri"/>
+              </a:rPr>
+              <a:t>propiedad</a:t>
+            </a:r>
+            <a:r>
+              <a:rPr lang="en-US" dirty="0">
+                <a:cs typeface="Calibri"/>
+              </a:rPr>
+              <a:t>. </a:t>
+            </a:r>
+            <a:r>
+              <a:rPr lang="en-US" dirty="0" err="1">
+                <a:cs typeface="Calibri"/>
+              </a:rPr>
+              <a:t>Analizamos</a:t>
+            </a:r>
+            <a:r>
+              <a:rPr lang="en-US" dirty="0">
+                <a:cs typeface="Calibri"/>
+              </a:rPr>
+              <a:t> </a:t>
+            </a:r>
+            <a:r>
+              <a:rPr lang="en-US" dirty="0" err="1">
+                <a:cs typeface="Calibri"/>
+              </a:rPr>
+              <a:t>su</a:t>
+            </a:r>
+            <a:r>
+              <a:rPr lang="en-US" dirty="0">
+                <a:cs typeface="Calibri"/>
+              </a:rPr>
+              <a:t> </a:t>
+            </a:r>
+            <a:r>
+              <a:rPr lang="en-US" dirty="0" err="1">
+                <a:cs typeface="Calibri"/>
+              </a:rPr>
+              <a:t>contenido</a:t>
+            </a:r>
+            <a:r>
+              <a:rPr lang="en-US" dirty="0">
+                <a:cs typeface="Calibri"/>
+              </a:rPr>
+              <a:t> para </a:t>
+            </a:r>
+            <a:r>
+              <a:rPr lang="en-US" dirty="0" err="1">
+                <a:cs typeface="Calibri"/>
+              </a:rPr>
+              <a:t>ver</a:t>
+            </a:r>
+            <a:r>
+              <a:rPr lang="en-US" dirty="0">
+                <a:cs typeface="Calibri"/>
+              </a:rPr>
+              <a:t> </a:t>
+            </a:r>
+            <a:r>
+              <a:rPr lang="en-US" dirty="0" err="1">
+                <a:cs typeface="Calibri"/>
+              </a:rPr>
+              <a:t>si</a:t>
+            </a:r>
+            <a:r>
+              <a:rPr lang="en-US" dirty="0">
+                <a:cs typeface="Calibri"/>
+              </a:rPr>
+              <a:t> </a:t>
+            </a:r>
+            <a:r>
+              <a:rPr lang="en-US" dirty="0" err="1">
+                <a:cs typeface="Calibri"/>
+              </a:rPr>
+              <a:t>contenía</a:t>
+            </a:r>
+            <a:r>
+              <a:rPr lang="en-US" dirty="0">
+                <a:cs typeface="Calibri"/>
+              </a:rPr>
+              <a:t> </a:t>
+            </a:r>
+            <a:r>
+              <a:rPr lang="en-US" dirty="0" err="1">
+                <a:cs typeface="Calibri"/>
+              </a:rPr>
+              <a:t>información</a:t>
+            </a:r>
+            <a:r>
+              <a:rPr lang="en-US" dirty="0">
+                <a:cs typeface="Calibri"/>
+              </a:rPr>
+              <a:t> </a:t>
+            </a:r>
+            <a:r>
+              <a:rPr lang="en-US" dirty="0" err="1">
+                <a:cs typeface="Calibri"/>
+              </a:rPr>
+              <a:t>útil</a:t>
+            </a:r>
+            <a:r>
+              <a:rPr lang="en-US" dirty="0">
+                <a:cs typeface="Calibri"/>
+              </a:rPr>
+              <a:t> para </a:t>
+            </a:r>
+            <a:r>
+              <a:rPr lang="en-US" dirty="0" err="1">
+                <a:cs typeface="Calibri"/>
+              </a:rPr>
+              <a:t>completar</a:t>
+            </a:r>
+            <a:r>
+              <a:rPr lang="en-US" dirty="0">
+                <a:cs typeface="Calibri"/>
+              </a:rPr>
+              <a:t> </a:t>
+            </a:r>
+            <a:r>
+              <a:rPr lang="en-US" dirty="0" err="1">
+                <a:cs typeface="Calibri"/>
+              </a:rPr>
+              <a:t>otros</a:t>
+            </a:r>
+            <a:r>
+              <a:rPr lang="en-US" dirty="0">
+                <a:cs typeface="Calibri"/>
+              </a:rPr>
+              <a:t> </a:t>
+            </a:r>
+            <a:r>
+              <a:rPr lang="en-US" dirty="0" err="1">
+                <a:cs typeface="Calibri"/>
+              </a:rPr>
+              <a:t>datos</a:t>
+            </a:r>
+            <a:r>
+              <a:rPr lang="en-US" dirty="0">
+                <a:cs typeface="Calibri"/>
+              </a:rPr>
+              <a:t> del data set. No </a:t>
+            </a:r>
+            <a:r>
+              <a:rPr lang="en-US" dirty="0" err="1">
+                <a:cs typeface="Calibri"/>
+              </a:rPr>
+              <a:t>siempre</a:t>
+            </a:r>
+            <a:r>
+              <a:rPr lang="en-US" dirty="0">
+                <a:cs typeface="Calibri"/>
+              </a:rPr>
+              <a:t> se </a:t>
+            </a:r>
+            <a:r>
+              <a:rPr lang="en-US" dirty="0" err="1">
+                <a:cs typeface="Calibri"/>
+              </a:rPr>
+              <a:t>hallaba</a:t>
+            </a:r>
+            <a:r>
+              <a:rPr lang="en-US" dirty="0">
+                <a:cs typeface="Calibri"/>
+              </a:rPr>
+              <a:t> </a:t>
+            </a:r>
+            <a:r>
+              <a:rPr lang="en-US" dirty="0" err="1">
+                <a:cs typeface="Calibri"/>
+              </a:rPr>
+              <a:t>información</a:t>
+            </a:r>
+            <a:r>
+              <a:rPr lang="en-US" dirty="0">
+                <a:cs typeface="Calibri"/>
+              </a:rPr>
+              <a:t> </a:t>
+            </a:r>
+            <a:r>
+              <a:rPr lang="en-US" dirty="0" err="1">
+                <a:cs typeface="Calibri"/>
+              </a:rPr>
+              <a:t>útil</a:t>
+            </a:r>
+            <a:r>
+              <a:rPr lang="en-US" dirty="0">
+                <a:cs typeface="Calibri"/>
+              </a:rPr>
+              <a:t>, </a:t>
+            </a:r>
+            <a:r>
+              <a:rPr lang="en-US" dirty="0" err="1">
+                <a:cs typeface="Calibri"/>
+              </a:rPr>
+              <a:t>pero</a:t>
+            </a:r>
+            <a:r>
+              <a:rPr lang="en-US" dirty="0">
+                <a:cs typeface="Calibri"/>
+              </a:rPr>
+              <a:t> </a:t>
+            </a:r>
+            <a:r>
+              <a:rPr lang="en-US" dirty="0" err="1">
+                <a:cs typeface="Calibri"/>
+              </a:rPr>
+              <a:t>cuando</a:t>
+            </a:r>
+            <a:r>
+              <a:rPr lang="en-US" dirty="0">
+                <a:cs typeface="Calibri"/>
+              </a:rPr>
+              <a:t> </a:t>
+            </a:r>
+            <a:r>
+              <a:rPr lang="en-US" dirty="0" err="1">
+                <a:cs typeface="Calibri"/>
+              </a:rPr>
+              <a:t>sí</a:t>
+            </a:r>
+            <a:r>
+              <a:rPr lang="en-US" dirty="0">
+                <a:cs typeface="Calibri"/>
+              </a:rPr>
+              <a:t>, la </a:t>
+            </a:r>
+            <a:r>
+              <a:rPr lang="en-US" dirty="0" err="1">
+                <a:cs typeface="Calibri"/>
+              </a:rPr>
+              <a:t>utilizamos</a:t>
+            </a:r>
+            <a:r>
+              <a:rPr lang="en-US" dirty="0">
+                <a:cs typeface="Calibri"/>
+              </a:rPr>
+              <a:t> para </a:t>
+            </a:r>
+            <a:r>
+              <a:rPr lang="en-US" dirty="0" err="1">
+                <a:cs typeface="Calibri"/>
+              </a:rPr>
+              <a:t>completar</a:t>
+            </a:r>
+            <a:r>
+              <a:rPr lang="en-US" dirty="0">
+                <a:cs typeface="Calibri"/>
+              </a:rPr>
+              <a:t> </a:t>
+            </a:r>
+            <a:r>
+              <a:rPr lang="en-US" dirty="0" err="1">
+                <a:cs typeface="Calibri"/>
+              </a:rPr>
+              <a:t>datos</a:t>
+            </a:r>
+            <a:r>
+              <a:rPr lang="en-US" dirty="0">
+                <a:cs typeface="Calibri"/>
+              </a:rPr>
+              <a:t> </a:t>
+            </a:r>
+            <a:r>
+              <a:rPr lang="en-US" dirty="0" err="1">
+                <a:cs typeface="Calibri"/>
+              </a:rPr>
+              <a:t>faltantes</a:t>
+            </a:r>
+            <a:r>
+              <a:rPr lang="en-US" dirty="0">
+                <a:cs typeface="Calibri"/>
+              </a:rPr>
+              <a:t>.</a:t>
+            </a:r>
+          </a:p>
+        </p:txBody>
+      </p:sp>
+    </p:spTree>
+    <p:extLst>
+      <p:ext uri="{BB962C8B-B14F-4D97-AF65-F5344CB8AC3E}">
+        <p14:creationId xmlns:p14="http://schemas.microsoft.com/office/powerpoint/2010/main" val="3372295044"/>
+      </p:ext>
+    </p:extLst>
+  </p:cSld>
+  <p:clrMapOvr>
+    <a:masterClrMapping/>
+  </p:clrMapOvr>
+</p:sld>
+</file>
+
+<file path=ppt/slides/slide12.xml><?xml version="1.0" encoding="utf-8"?>
+<p:sld xmlns:a="http://schemas.openxmlformats.org/drawingml/2006/main" xmlns:r="http://schemas.openxmlformats.org/officeDocument/2006/relationships" xmlns:p="http://schemas.openxmlformats.org/presentationml/2006/main">
+  <p:cSld>
+    <p:spTree>
+      <p:nvGrpSpPr>
+        <p:cNvPr id="1" name=""/>
+        <p:cNvGrpSpPr/>
+        <p:nvPr/>
+      </p:nvGrpSpPr>
+      <p:grpSpPr>
+        <a:xfrm>
+          <a:off x="0" y="0"/>
+          <a:ext cx="0" cy="0"/>
+          <a:chOff x="0" y="0"/>
+          <a:chExt cx="0" cy="0"/>
+        </a:xfrm>
+      </p:grpSpPr>
+      <p:sp>
+        <p:nvSpPr>
+          <p:cNvPr id="2" name="Title 1"/>
+          <p:cNvSpPr>
+            <a:spLocks noGrp="1"/>
+          </p:cNvSpPr>
+          <p:nvPr>
+            <p:ph type="title"/>
+          </p:nvPr>
+        </p:nvSpPr>
+        <p:spPr/>
+        <p:txBody>
+          <a:bodyPr/>
+          <a:lstStyle/>
+          <a:p>
+            <a:endParaRPr lang="en-US"/>
+          </a:p>
+        </p:txBody>
+      </p:sp>
+      <p:sp>
+        <p:nvSpPr>
+          <p:cNvPr id="3" name="Content Placeholder 2"/>
+          <p:cNvSpPr>
+            <a:spLocks noGrp="1"/>
+          </p:cNvSpPr>
+          <p:nvPr>
+            <p:ph idx="1"/>
+          </p:nvPr>
+        </p:nvSpPr>
+        <p:spPr/>
+        <p:txBody>
+          <a:bodyPr anchor="t"/>
+          <a:lstStyle/>
+          <a:p>
+            <a:r>
+              <a:rPr lang="en-US" dirty="0" err="1">
+                <a:cs typeface="Calibri"/>
+              </a:rPr>
+              <a:t>Información</a:t>
+            </a:r>
+            <a:r>
+              <a:rPr lang="en-US" dirty="0">
+                <a:cs typeface="Calibri"/>
+              </a:rPr>
+              <a:t> </a:t>
+            </a:r>
+            <a:r>
+              <a:rPr lang="en-US" dirty="0" err="1">
+                <a:cs typeface="Calibri"/>
+              </a:rPr>
+              <a:t>adicional</a:t>
+            </a:r>
+            <a:r>
+              <a:rPr lang="en-US" dirty="0">
+                <a:cs typeface="Calibri"/>
+              </a:rPr>
+              <a:t> </a:t>
+            </a:r>
+            <a:r>
+              <a:rPr lang="en-US" dirty="0" err="1">
+                <a:cs typeface="Calibri"/>
+              </a:rPr>
+              <a:t>utilizada</a:t>
+            </a:r>
+          </a:p>
+          <a:p>
+            <a:endParaRPr lang="en-US" dirty="0">
+              <a:cs typeface="Calibri"/>
+            </a:endParaRPr>
+          </a:p>
+          <a:p>
+            <a:r>
+              <a:rPr lang="en-US" dirty="0" err="1">
+                <a:cs typeface="Calibri"/>
+              </a:rPr>
+              <a:t>Utilizamos</a:t>
+            </a:r>
+            <a:r>
+              <a:rPr lang="en-US" dirty="0">
+                <a:cs typeface="Calibri"/>
+              </a:rPr>
+              <a:t> la </a:t>
+            </a:r>
+            <a:r>
+              <a:rPr lang="en-US" dirty="0" err="1">
+                <a:cs typeface="Calibri"/>
+              </a:rPr>
+              <a:t>api</a:t>
+            </a:r>
+            <a:r>
+              <a:rPr lang="en-US" dirty="0">
+                <a:cs typeface="Calibri"/>
+              </a:rPr>
+              <a:t> del sitio </a:t>
+            </a:r>
+            <a:r>
+              <a:rPr lang="en-US" dirty="0">
+                <a:ea typeface="+mn-lt"/>
+                <a:cs typeface="+mn-lt"/>
+                <a:hlinkClick r:id="rId2"/>
+              </a:rPr>
+              <a:t>https://www.geonames.org/</a:t>
+            </a:r>
+            <a:r>
+              <a:rPr lang="en-US" dirty="0">
+                <a:ea typeface="+mn-lt"/>
+                <a:cs typeface="+mn-lt"/>
+              </a:rPr>
+              <a:t> para </a:t>
+            </a:r>
+            <a:r>
+              <a:rPr lang="en-US" dirty="0" err="1">
+                <a:ea typeface="+mn-lt"/>
+                <a:cs typeface="+mn-lt"/>
+              </a:rPr>
+              <a:t>obtener</a:t>
+            </a:r>
+            <a:r>
+              <a:rPr lang="en-US" dirty="0">
+                <a:ea typeface="+mn-lt"/>
+                <a:cs typeface="+mn-lt"/>
+              </a:rPr>
+              <a:t> </a:t>
+            </a:r>
+            <a:r>
+              <a:rPr lang="en-US" dirty="0" err="1">
+                <a:ea typeface="+mn-lt"/>
+                <a:cs typeface="+mn-lt"/>
+              </a:rPr>
+              <a:t>coordenadas</a:t>
+            </a:r>
+            <a:r>
+              <a:rPr lang="en-US" dirty="0">
+                <a:ea typeface="+mn-lt"/>
+                <a:cs typeface="+mn-lt"/>
+              </a:rPr>
+              <a:t> </a:t>
+            </a:r>
+            <a:r>
+              <a:rPr lang="en-US" dirty="0" err="1">
+                <a:ea typeface="+mn-lt"/>
+                <a:cs typeface="+mn-lt"/>
+              </a:rPr>
+              <a:t>representativas</a:t>
+            </a:r>
+            <a:r>
+              <a:rPr lang="en-US" dirty="0">
+                <a:ea typeface="+mn-lt"/>
+                <a:cs typeface="+mn-lt"/>
+              </a:rPr>
+              <a:t> para </a:t>
+            </a:r>
+            <a:r>
+              <a:rPr lang="en-US" dirty="0" err="1">
+                <a:ea typeface="+mn-lt"/>
+                <a:cs typeface="+mn-lt"/>
+              </a:rPr>
+              <a:t>cada</a:t>
+            </a:r>
+            <a:r>
+              <a:rPr lang="en-US" dirty="0">
+                <a:ea typeface="+mn-lt"/>
+                <a:cs typeface="+mn-lt"/>
+              </a:rPr>
+              <a:t> zona.</a:t>
+            </a:r>
+          </a:p>
+          <a:p>
+            <a:endParaRPr lang="en-US" dirty="0">
+              <a:ea typeface="+mn-lt"/>
+              <a:cs typeface="+mn-lt"/>
+            </a:endParaRPr>
+          </a:p>
+          <a:p>
+            <a:r>
+              <a:rPr lang="en-US" dirty="0" err="1">
+                <a:ea typeface="+mn-lt"/>
+                <a:cs typeface="+mn-lt"/>
+              </a:rPr>
+              <a:t>También</a:t>
+            </a:r>
+            <a:r>
+              <a:rPr lang="en-US" dirty="0">
+                <a:ea typeface="+mn-lt"/>
+                <a:cs typeface="+mn-lt"/>
+              </a:rPr>
+              <a:t> </a:t>
+            </a:r>
+            <a:r>
+              <a:rPr lang="en-US" dirty="0" err="1">
+                <a:ea typeface="+mn-lt"/>
+                <a:cs typeface="+mn-lt"/>
+              </a:rPr>
+              <a:t>agregamos</a:t>
+            </a:r>
+            <a:r>
+              <a:rPr lang="en-US" dirty="0">
+                <a:ea typeface="+mn-lt"/>
+                <a:cs typeface="+mn-lt"/>
+              </a:rPr>
+              <a:t> </a:t>
+            </a:r>
+            <a:r>
+              <a:rPr lang="en-US" dirty="0" err="1">
+                <a:ea typeface="+mn-lt"/>
+                <a:cs typeface="+mn-lt"/>
+              </a:rPr>
+              <a:t>datos</a:t>
+            </a:r>
+            <a:r>
+              <a:rPr lang="en-US" dirty="0">
+                <a:ea typeface="+mn-lt"/>
+                <a:cs typeface="+mn-lt"/>
+              </a:rPr>
+              <a:t> </a:t>
+            </a:r>
+            <a:r>
+              <a:rPr lang="en-US" dirty="0" err="1">
+                <a:ea typeface="+mn-lt"/>
+                <a:cs typeface="+mn-lt"/>
+              </a:rPr>
+              <a:t>correspondientes</a:t>
+            </a:r>
+            <a:r>
+              <a:rPr lang="en-US" dirty="0">
+                <a:ea typeface="+mn-lt"/>
+                <a:cs typeface="+mn-lt"/>
+              </a:rPr>
+              <a:t> a la </a:t>
+            </a:r>
+            <a:r>
+              <a:rPr lang="en-US" dirty="0" err="1">
+                <a:ea typeface="+mn-lt"/>
+                <a:cs typeface="+mn-lt"/>
+              </a:rPr>
+              <a:t>conversión</a:t>
+            </a:r>
+            <a:r>
+              <a:rPr lang="en-US" dirty="0">
+                <a:ea typeface="+mn-lt"/>
+                <a:cs typeface="+mn-lt"/>
+              </a:rPr>
+              <a:t> </a:t>
+            </a:r>
+            <a:r>
+              <a:rPr lang="en-US" dirty="0" err="1">
+                <a:ea typeface="+mn-lt"/>
+                <a:cs typeface="+mn-lt"/>
+              </a:rPr>
+              <a:t>monetaria</a:t>
+            </a:r>
+            <a:r>
+              <a:rPr lang="en-US" dirty="0">
+                <a:ea typeface="+mn-lt"/>
+                <a:cs typeface="+mn-lt"/>
+              </a:rPr>
+              <a:t> entre </a:t>
+            </a:r>
+            <a:r>
+              <a:rPr lang="en-US" dirty="0" err="1">
+                <a:ea typeface="+mn-lt"/>
+                <a:cs typeface="+mn-lt"/>
+              </a:rPr>
+              <a:t>monedas</a:t>
+            </a:r>
+            <a:r>
+              <a:rPr lang="en-US" dirty="0">
+                <a:ea typeface="+mn-lt"/>
+                <a:cs typeface="+mn-lt"/>
+              </a:rPr>
+              <a:t> locales a USD</a:t>
+            </a:r>
           </a:p>
         </p:txBody>
       </p:sp>
@@ -1745,6 +3023,210 @@
     <p:extLst>
       <p:ext uri="{BB962C8B-B14F-4D97-AF65-F5344CB8AC3E}">
         <p14:creationId xmlns:p14="http://schemas.microsoft.com/office/powerpoint/2010/main" val="3233618901"/>
+      </p:ext>
+    </p:extLst>
+  </p:cSld>
+  <p:clrMapOvr>
+    <a:masterClrMapping/>
+  </p:clrMapOvr>
+</p:sld>
+</file>
+
+<file path=ppt/slides/slide13.xml><?xml version="1.0" encoding="utf-8"?>
+<p:sld xmlns:a="http://schemas.openxmlformats.org/drawingml/2006/main" xmlns:r="http://schemas.openxmlformats.org/officeDocument/2006/relationships" xmlns:p="http://schemas.openxmlformats.org/presentationml/2006/main">
+  <p:cSld>
+    <p:spTree>
+      <p:nvGrpSpPr>
+        <p:cNvPr id="1" name=""/>
+        <p:cNvGrpSpPr/>
+        <p:nvPr/>
+      </p:nvGrpSpPr>
+      <p:grpSpPr>
+        <a:xfrm>
+          <a:off x="0" y="0"/>
+          <a:ext cx="0" cy="0"/>
+          <a:chOff x="0" y="0"/>
+          <a:chExt cx="0" cy="0"/>
+        </a:xfrm>
+      </p:grpSpPr>
+      <p:sp>
+        <p:nvSpPr>
+          <p:cNvPr id="2" name="Title 1"/>
+          <p:cNvSpPr>
+            <a:spLocks noGrp="1"/>
+          </p:cNvSpPr>
+          <p:nvPr>
+            <p:ph type="title"/>
+          </p:nvPr>
+        </p:nvSpPr>
+        <p:spPr/>
+        <p:txBody>
+          <a:bodyPr/>
+          <a:lstStyle/>
+          <a:p>
+            <a:endParaRPr lang="en-US"/>
+          </a:p>
+        </p:txBody>
+      </p:sp>
+      <p:sp>
+        <p:nvSpPr>
+          <p:cNvPr id="3" name="Content Placeholder 2"/>
+          <p:cNvSpPr>
+            <a:spLocks noGrp="1"/>
+          </p:cNvSpPr>
+          <p:nvPr>
+            <p:ph idx="1"/>
+          </p:nvPr>
+        </p:nvSpPr>
+        <p:spPr/>
+        <p:txBody>
+          <a:bodyPr/>
+          <a:lstStyle/>
+          <a:p>
+            <a:endParaRPr lang="en-US"/>
+          </a:p>
+        </p:txBody>
+      </p:sp>
+    </p:spTree>
+    <p:extLst>
+      <p:ext uri="{BB962C8B-B14F-4D97-AF65-F5344CB8AC3E}">
+        <p14:creationId xmlns:p14="http://schemas.microsoft.com/office/powerpoint/2010/main" val="2670554618"/>
+      </p:ext>
+    </p:extLst>
+  </p:cSld>
+  <p:clrMapOvr>
+    <a:masterClrMapping/>
+  </p:clrMapOvr>
+</p:sld>
+</file>
+
+<file path=ppt/slides/slide14.xml><?xml version="1.0" encoding="utf-8"?>
+<p:sld xmlns:a="http://schemas.openxmlformats.org/drawingml/2006/main" xmlns:r="http://schemas.openxmlformats.org/officeDocument/2006/relationships" xmlns:p="http://schemas.openxmlformats.org/presentationml/2006/main">
+  <p:cSld>
+    <p:spTree>
+      <p:nvGrpSpPr>
+        <p:cNvPr id="1" name=""/>
+        <p:cNvGrpSpPr/>
+        <p:nvPr/>
+      </p:nvGrpSpPr>
+      <p:grpSpPr>
+        <a:xfrm>
+          <a:off x="0" y="0"/>
+          <a:ext cx="0" cy="0"/>
+          <a:chOff x="0" y="0"/>
+          <a:chExt cx="0" cy="0"/>
+        </a:xfrm>
+      </p:grpSpPr>
+      <p:sp>
+        <p:nvSpPr>
+          <p:cNvPr id="2" name="Title 1"/>
+          <p:cNvSpPr>
+            <a:spLocks noGrp="1"/>
+          </p:cNvSpPr>
+          <p:nvPr>
+            <p:ph type="title"/>
+          </p:nvPr>
+        </p:nvSpPr>
+        <p:spPr/>
+        <p:txBody>
+          <a:bodyPr/>
+          <a:lstStyle/>
+          <a:p>
+            <a:endParaRPr lang="en-US"/>
+          </a:p>
+        </p:txBody>
+      </p:sp>
+      <p:sp>
+        <p:nvSpPr>
+          <p:cNvPr id="3" name="Content Placeholder 2"/>
+          <p:cNvSpPr>
+            <a:spLocks noGrp="1"/>
+          </p:cNvSpPr>
+          <p:nvPr>
+            <p:ph idx="1"/>
+          </p:nvPr>
+        </p:nvSpPr>
+        <p:spPr/>
+        <p:txBody>
+          <a:bodyPr/>
+          <a:lstStyle/>
+          <a:p>
+            <a:endParaRPr lang="en-US"/>
+          </a:p>
+        </p:txBody>
+      </p:sp>
+    </p:spTree>
+    <p:extLst>
+      <p:ext uri="{BB962C8B-B14F-4D97-AF65-F5344CB8AC3E}">
+        <p14:creationId xmlns:p14="http://schemas.microsoft.com/office/powerpoint/2010/main" val="2000169201"/>
+      </p:ext>
+    </p:extLst>
+  </p:cSld>
+  <p:clrMapOvr>
+    <a:masterClrMapping/>
+  </p:clrMapOvr>
+</p:sld>
+</file>
+
+<file path=ppt/slides/slide15.xml><?xml version="1.0" encoding="utf-8"?>
+<p:sld xmlns:a="http://schemas.openxmlformats.org/drawingml/2006/main" xmlns:r="http://schemas.openxmlformats.org/officeDocument/2006/relationships" xmlns:p="http://schemas.openxmlformats.org/presentationml/2006/main">
+  <p:cSld>
+    <p:spTree>
+      <p:nvGrpSpPr>
+        <p:cNvPr id="1" name=""/>
+        <p:cNvGrpSpPr/>
+        <p:nvPr/>
+      </p:nvGrpSpPr>
+      <p:grpSpPr>
+        <a:xfrm>
+          <a:off x="0" y="0"/>
+          <a:ext cx="0" cy="0"/>
+          <a:chOff x="0" y="0"/>
+          <a:chExt cx="0" cy="0"/>
+        </a:xfrm>
+      </p:grpSpPr>
+      <p:sp>
+        <p:nvSpPr>
+          <p:cNvPr id="2" name="Title 1"/>
+          <p:cNvSpPr>
+            <a:spLocks noGrp="1"/>
+          </p:cNvSpPr>
+          <p:nvPr>
+            <p:ph type="title"/>
+          </p:nvPr>
+        </p:nvSpPr>
+        <p:spPr/>
+        <p:txBody>
+          <a:bodyPr/>
+          <a:lstStyle/>
+          <a:p>
+            <a:endParaRPr lang="en-US"/>
+          </a:p>
+        </p:txBody>
+      </p:sp>
+      <p:sp>
+        <p:nvSpPr>
+          <p:cNvPr id="3" name="Content Placeholder 2"/>
+          <p:cNvSpPr>
+            <a:spLocks noGrp="1"/>
+          </p:cNvSpPr>
+          <p:nvPr>
+            <p:ph idx="1"/>
+          </p:nvPr>
+        </p:nvSpPr>
+        <p:spPr/>
+        <p:txBody>
+          <a:bodyPr/>
+          <a:lstStyle/>
+          <a:p>
+            <a:endParaRPr lang="en-US"/>
+          </a:p>
+        </p:txBody>
+      </p:sp>
+    </p:spTree>
+    <p:extLst>
+      <p:ext uri="{BB962C8B-B14F-4D97-AF65-F5344CB8AC3E}">
+        <p14:creationId xmlns:p14="http://schemas.microsoft.com/office/powerpoint/2010/main" val="1176548922"/>
       </p:ext>
     </p:extLst>
   </p:cSld>
@@ -1807,7 +3289,7 @@
           <a:p>
             <a:pPr algn="ctr"/>
             <a:r>
-              <a:rPr lang="es-AR" u="sng" dirty="0" smtClean="0">
+              <a:rPr lang="es-AR" u="sng" dirty="0">
                 <a:effectLst>
                   <a:outerShdw blurRad="38100" dist="38100" dir="2700000" algn="tl">
                     <a:srgbClr val="000000">
@@ -1819,7 +3301,7 @@
               <a:t>Integrantes</a:t>
             </a:r>
             <a:r>
-              <a:rPr lang="es-AR" dirty="0" smtClean="0"/>
+              <a:rPr lang="es-AR" dirty="0"/>
               <a:t>:</a:t>
             </a:r>
           </a:p>
@@ -1830,29 +3312,25 @@
               </a:lnSpc>
             </a:pPr>
             <a:r>
-              <a:rPr lang="en-US" dirty="0" smtClean="0"/>
+              <a:rPr lang="en-US" dirty="0"/>
               <a:t>David </a:t>
             </a:r>
             <a:r>
               <a:rPr lang="en-US" dirty="0" err="1"/>
               <a:t>Gagliano</a:t>
-            </a:r>
-            <a:r>
-              <a:rPr lang="en-US" dirty="0"/>
-              <a:t/>
             </a:r>
             <a:br>
               <a:rPr lang="en-US" dirty="0"/>
             </a:br>
             <a:r>
-              <a:rPr lang="en-US" dirty="0" smtClean="0"/>
+              <a:rPr lang="en-US" dirty="0"/>
               <a:t>Alejandro </a:t>
             </a:r>
             <a:r>
-              <a:rPr lang="en-US" dirty="0" err="1" smtClean="0"/>
+              <a:rPr lang="en-US" dirty="0" err="1"/>
               <a:t>Garavano</a:t>
             </a:r>
-            <a:endParaRPr lang="en-US" dirty="0" smtClean="0"/>
+            <a:endParaRPr lang="en-US" dirty="0"/>
           </a:p>
           <a:p>
             <a:pPr algn="ctr">
@@ -1861,14 +3339,14 @@
               </a:lnSpc>
             </a:pPr>
             <a:r>
-              <a:rPr lang="en-US" dirty="0" smtClean="0"/>
+              <a:rPr lang="en-US" dirty="0"/>
               <a:t>Santiago Jose </a:t>
             </a:r>
             <a:r>
-              <a:rPr lang="en-US" dirty="0" err="1" smtClean="0"/>
+              <a:rPr lang="en-US" dirty="0" err="1"/>
               <a:t>Mañan</a:t>
             </a:r>
-            <a:endParaRPr lang="en-US" dirty="0" smtClean="0"/>
+            <a:endParaRPr lang="en-US" dirty="0"/>
           </a:p>
           <a:p>
             <a:pPr algn="ctr">
@@ -1877,14 +3355,14 @@
               </a:lnSpc>
             </a:pPr>
             <a:r>
-              <a:rPr lang="en-US" dirty="0" smtClean="0"/>
+              <a:rPr lang="en-US" dirty="0"/>
               <a:t>Diego </a:t>
             </a:r>
             <a:r>
-              <a:rPr lang="en-US" dirty="0" err="1" smtClean="0"/>
+              <a:rPr lang="en-US" dirty="0" err="1"/>
               <a:t>Pais</a:t>
             </a:r>
-            <a:endParaRPr lang="en-US" dirty="0" smtClean="0"/>
+            <a:endParaRPr lang="en-US" dirty="0"/>
           </a:p>
           <a:p>
             <a:pPr algn="ctr">
@@ -1893,11 +3371,11 @@
               </a:lnSpc>
             </a:pPr>
             <a:r>
-              <a:rPr lang="en-US" dirty="0" smtClean="0"/>
+              <a:rPr lang="en-US" dirty="0"/>
               <a:t>Franco </a:t>
             </a:r>
             <a:r>
-              <a:rPr lang="en-US" dirty="0" err="1" smtClean="0"/>
+              <a:rPr lang="en-US" dirty="0" err="1"/>
               <a:t>Scavini</a:t>
             </a:r>
             <a:endParaRPr lang="en-US" dirty="0"/>
@@ -1914,13 +3392,6 @@
   <p:clrMapOvr>
     <a:masterClrMapping/>
   </p:clrMapOvr>
-  <p:timing>
-    <p:tnLst>
-      <p:par>
-        <p:cTn id="1" dur="indefinite" restart="never" nodeType="tmRoot"/>
-      </p:par>
-    </p:tnLst>
-  </p:timing>
 </p:sld>
 </file>
 
@@ -1983,54 +3454,54 @@
           <a:lstStyle/>
           <a:p>
             <a:r>
-              <a:rPr lang="es-AR" sz="2400" dirty="0" err="1" smtClean="0"/>
+              <a:rPr lang="es-AR" sz="2400" dirty="0" err="1"/>
               <a:t>place_name</a:t>
             </a:r>
             <a:r>
-              <a:rPr lang="es-AR" sz="2400" dirty="0" smtClean="0"/>
+              <a:rPr lang="es-AR" sz="2400" dirty="0"/>
               <a:t> con 23 entradas faltantes (el resto completas)</a:t>
             </a:r>
           </a:p>
           <a:p>
-            <a:endParaRPr lang="es-AR" sz="2400" dirty="0" smtClean="0"/>
-          </a:p>
-          <a:p>
             <a:endParaRPr lang="es-AR" sz="2400" dirty="0"/>
           </a:p>
           <a:p>
-            <a:endParaRPr lang="es-AR" sz="2400" dirty="0" smtClean="0"/>
-          </a:p>
-          <a:p>
-            <a:r>
-              <a:rPr lang="es-AR" sz="2400" dirty="0" smtClean="0"/>
+            <a:endParaRPr lang="es-AR" sz="2400" dirty="0"/>
+          </a:p>
+          <a:p>
+            <a:endParaRPr lang="es-AR" sz="2400" dirty="0"/>
+          </a:p>
+          <a:p>
+            <a:r>
+              <a:rPr lang="es-AR" sz="2400" dirty="0"/>
               <a:t>La mayor parte de información se concentra en </a:t>
             </a:r>
             <a:r>
-              <a:rPr lang="en-US" sz="2400" dirty="0" err="1" smtClean="0"/>
+              <a:rPr lang="en-US" sz="2400" dirty="0" err="1"/>
               <a:t>place_with_parent_names</a:t>
             </a:r>
-            <a:endParaRPr lang="en-US" sz="2400" dirty="0" smtClean="0"/>
-          </a:p>
-          <a:p>
-            <a:endParaRPr lang="es-AR" sz="2400" dirty="0" smtClean="0"/>
+            <a:endParaRPr lang="en-US" sz="2400" dirty="0"/>
           </a:p>
           <a:p>
             <a:endParaRPr lang="es-AR" sz="2400" dirty="0"/>
           </a:p>
           <a:p>
-            <a:r>
-              <a:rPr lang="es-AR" sz="2400" dirty="0" smtClean="0"/>
+            <a:endParaRPr lang="es-AR" sz="2400" dirty="0"/>
+          </a:p>
+          <a:p>
+            <a:r>
+              <a:rPr lang="es-AR" sz="2400" dirty="0"/>
               <a:t>De esa columna se disgregó la información en 5 nuevas columnas con información de país, provincia, ciudad, barrio y zona para completar otra información faltante (</a:t>
             </a:r>
             <a:r>
-              <a:rPr lang="es-AR" sz="2400" dirty="0" err="1" smtClean="0"/>
+              <a:rPr lang="es-AR" sz="2400" dirty="0" err="1"/>
               <a:t>place_name</a:t>
             </a:r>
             <a:r>
-              <a:rPr lang="es-AR" sz="2400" dirty="0" smtClean="0"/>
+              <a:rPr lang="es-AR" sz="2400" dirty="0"/>
               <a:t> principalmente).</a:t>
             </a:r>
-            <a:endParaRPr lang="en-US" sz="2400" dirty="0" smtClean="0"/>
+            <a:endParaRPr lang="en-US" sz="2400" dirty="0"/>
           </a:p>
           <a:p>
             <a:endParaRPr lang="en-US" sz="2400" dirty="0"/>
@@ -2302,13 +3773,6 @@
   <p:clrMapOvr>
     <a:masterClrMapping/>
   </p:clrMapOvr>
-  <p:timing>
-    <p:tnLst>
-      <p:par>
-        <p:cTn id="1" dur="indefinite" restart="never" nodeType="tmRoot"/>
-      </p:par>
-    </p:tnLst>
-  </p:timing>
 </p:sld>
 </file>
 
@@ -2358,12 +3822,406 @@
             <p:ph idx="1"/>
           </p:nvPr>
         </p:nvSpPr>
-        <p:spPr/>
+        <p:spPr>
+          <a:xfrm>
+            <a:off x="838200" y="1911889"/>
+            <a:ext cx="10515600" cy="4265074"/>
+          </a:xfrm>
+        </p:spPr>
         <p:txBody>
-          <a:bodyPr/>
+          <a:bodyPr anchor="t"/>
           <a:lstStyle/>
           <a:p>
-            <a:endParaRPr lang="en-US"/>
+            <a:r>
+              <a:rPr lang="en-US" dirty="0" err="1">
+                <a:cs typeface="Calibri"/>
+              </a:rPr>
+              <a:t>Análisis</a:t>
+            </a:r>
+            <a:r>
+              <a:rPr lang="en-US" dirty="0">
+                <a:cs typeface="Calibri"/>
+              </a:rPr>
+              <a:t> </a:t>
+            </a:r>
+            <a:r>
+              <a:rPr lang="en-US" dirty="0" err="1">
+                <a:cs typeface="Calibri"/>
+              </a:rPr>
+              <a:t>estructural</a:t>
+            </a:r>
+            <a:r>
+              <a:rPr lang="en-US" dirty="0">
+                <a:cs typeface="Calibri"/>
+              </a:rPr>
+              <a:t> de los </a:t>
+            </a:r>
+            <a:r>
+              <a:rPr lang="en-US" dirty="0" err="1">
+                <a:cs typeface="Calibri"/>
+              </a:rPr>
+              <a:t>datos</a:t>
+            </a:r>
+          </a:p>
+          <a:p>
+            <a:endParaRPr lang="en-US" dirty="0">
+              <a:cs typeface="Calibri"/>
+            </a:endParaRPr>
+          </a:p>
+          <a:p>
+            <a:r>
+              <a:rPr lang="en-US" dirty="0">
+                <a:cs typeface="Calibri"/>
+              </a:rPr>
+              <a:t>En general el set de </a:t>
+            </a:r>
+            <a:r>
+              <a:rPr lang="en-US" dirty="0" err="1">
+                <a:cs typeface="Calibri"/>
+              </a:rPr>
+              <a:t>datos</a:t>
+            </a:r>
+            <a:r>
+              <a:rPr lang="en-US" dirty="0">
+                <a:cs typeface="Calibri"/>
+              </a:rPr>
+              <a:t> </a:t>
+            </a:r>
+            <a:r>
+              <a:rPr lang="en-US" dirty="0" err="1">
+                <a:cs typeface="Calibri"/>
+              </a:rPr>
+              <a:t>tenía</a:t>
+            </a:r>
+            <a:r>
+              <a:rPr lang="en-US" dirty="0">
+                <a:cs typeface="Calibri"/>
+              </a:rPr>
+              <a:t> una </a:t>
+            </a:r>
+            <a:r>
+              <a:rPr lang="en-US" dirty="0" err="1">
+                <a:cs typeface="Calibri"/>
+              </a:rPr>
+              <a:t>estructura</a:t>
+            </a:r>
+            <a:r>
+              <a:rPr lang="en-US" dirty="0">
+                <a:cs typeface="Calibri"/>
+              </a:rPr>
+              <a:t> bien </a:t>
+            </a:r>
+            <a:r>
+              <a:rPr lang="en-US" dirty="0" err="1">
+                <a:cs typeface="Calibri"/>
+              </a:rPr>
+              <a:t>definida</a:t>
+            </a:r>
+            <a:r>
+              <a:rPr lang="en-US" dirty="0">
+                <a:cs typeface="Calibri"/>
+              </a:rPr>
+              <a:t>. Casi </a:t>
+            </a:r>
+            <a:r>
+              <a:rPr lang="en-US" dirty="0" err="1">
+                <a:cs typeface="Calibri"/>
+              </a:rPr>
+              <a:t>todas</a:t>
+            </a:r>
+            <a:r>
+              <a:rPr lang="en-US" dirty="0">
+                <a:cs typeface="Calibri"/>
+              </a:rPr>
+              <a:t> los </a:t>
+            </a:r>
+            <a:r>
+              <a:rPr lang="en-US" dirty="0" err="1">
+                <a:cs typeface="Calibri"/>
+              </a:rPr>
+              <a:t>datos</a:t>
+            </a:r>
+            <a:r>
+              <a:rPr lang="en-US" dirty="0">
+                <a:cs typeface="Calibri"/>
+              </a:rPr>
+              <a:t> </a:t>
+            </a:r>
+            <a:r>
+              <a:rPr lang="en-US" dirty="0" err="1">
+                <a:cs typeface="Calibri"/>
+              </a:rPr>
+              <a:t>contaban</a:t>
+            </a:r>
+            <a:r>
+              <a:rPr lang="en-US" dirty="0">
+                <a:cs typeface="Calibri"/>
+              </a:rPr>
+              <a:t> con una </a:t>
+            </a:r>
+            <a:r>
+              <a:rPr lang="en-US" dirty="0" err="1">
+                <a:cs typeface="Calibri"/>
+              </a:rPr>
+              <a:t>identificación</a:t>
+            </a:r>
+            <a:r>
+              <a:rPr lang="en-US" dirty="0">
+                <a:cs typeface="Calibri"/>
+              </a:rPr>
+              <a:t> </a:t>
+            </a:r>
+            <a:r>
+              <a:rPr lang="en-US" dirty="0" err="1">
+                <a:cs typeface="Calibri"/>
+              </a:rPr>
+              <a:t>clara</a:t>
+            </a:r>
+            <a:r>
+              <a:rPr lang="en-US" dirty="0">
+                <a:cs typeface="Calibri"/>
+              </a:rPr>
+              <a:t>, a </a:t>
+            </a:r>
+            <a:r>
+              <a:rPr lang="en-US" dirty="0" err="1">
+                <a:cs typeface="Calibri"/>
+              </a:rPr>
+              <a:t>excepción</a:t>
+            </a:r>
+            <a:r>
+              <a:rPr lang="en-US" dirty="0">
+                <a:cs typeface="Calibri"/>
+              </a:rPr>
+              <a:t> de un solo </a:t>
+            </a:r>
+            <a:r>
+              <a:rPr lang="en-US" dirty="0" err="1">
+                <a:cs typeface="Calibri"/>
+              </a:rPr>
+              <a:t>dato</a:t>
+            </a:r>
+            <a:r>
+              <a:rPr lang="en-US" dirty="0">
+                <a:cs typeface="Calibri"/>
+              </a:rPr>
+              <a:t>, que lo </a:t>
+            </a:r>
+            <a:r>
+              <a:rPr lang="en-US" dirty="0" err="1">
+                <a:cs typeface="Calibri"/>
+              </a:rPr>
+              <a:t>asumimos</a:t>
+            </a:r>
+            <a:r>
+              <a:rPr lang="en-US" dirty="0">
+                <a:cs typeface="Calibri"/>
+              </a:rPr>
+              <a:t> </a:t>
+            </a:r>
+            <a:r>
+              <a:rPr lang="en-US" dirty="0" err="1">
+                <a:cs typeface="Calibri"/>
+              </a:rPr>
+              <a:t>como</a:t>
+            </a:r>
+            <a:r>
+              <a:rPr lang="en-US" dirty="0">
+                <a:cs typeface="Calibri"/>
+              </a:rPr>
+              <a:t> un </a:t>
+            </a:r>
+            <a:r>
+              <a:rPr lang="en-US" dirty="0" err="1">
+                <a:cs typeface="Calibri"/>
+              </a:rPr>
+              <a:t>dato</a:t>
+            </a:r>
+            <a:r>
+              <a:rPr lang="en-US" dirty="0">
+                <a:cs typeface="Calibri"/>
+              </a:rPr>
+              <a:t> Id y se </a:t>
+            </a:r>
+            <a:r>
+              <a:rPr lang="en-US" dirty="0" err="1">
+                <a:cs typeface="Calibri"/>
+              </a:rPr>
+              <a:t>comporta</a:t>
+            </a:r>
+            <a:r>
+              <a:rPr lang="en-US" dirty="0">
+                <a:cs typeface="Calibri"/>
+              </a:rPr>
+              <a:t> de </a:t>
+            </a:r>
+            <a:r>
+              <a:rPr lang="en-US" dirty="0" err="1">
+                <a:cs typeface="Calibri"/>
+              </a:rPr>
+              <a:t>manera</a:t>
+            </a:r>
+            <a:r>
+              <a:rPr lang="en-US" dirty="0">
+                <a:cs typeface="Calibri"/>
+              </a:rPr>
+              <a:t> similar a un </a:t>
+            </a:r>
+            <a:r>
+              <a:rPr lang="en-US" dirty="0" err="1">
+                <a:cs typeface="Calibri"/>
+              </a:rPr>
+              <a:t>índice</a:t>
+            </a:r>
+            <a:r>
+              <a:rPr lang="en-US" dirty="0">
+                <a:cs typeface="Calibri"/>
+              </a:rPr>
+              <a:t>.</a:t>
+            </a:r>
+          </a:p>
+          <a:p>
+            <a:r>
+              <a:rPr lang="en-US" dirty="0">
+                <a:cs typeface="Calibri"/>
+              </a:rPr>
+              <a:t>En </a:t>
+            </a:r>
+            <a:r>
+              <a:rPr lang="en-US" dirty="0" err="1">
+                <a:cs typeface="Calibri"/>
+              </a:rPr>
+              <a:t>cuanto</a:t>
+            </a:r>
+            <a:r>
+              <a:rPr lang="en-US" dirty="0">
+                <a:cs typeface="Calibri"/>
+              </a:rPr>
+              <a:t> a los </a:t>
+            </a:r>
+            <a:r>
+              <a:rPr lang="en-US" dirty="0" err="1">
+                <a:cs typeface="Calibri"/>
+              </a:rPr>
+              <a:t>tipos</a:t>
+            </a:r>
+            <a:r>
+              <a:rPr lang="en-US" dirty="0">
+                <a:cs typeface="Calibri"/>
+              </a:rPr>
+              <a:t> de </a:t>
+            </a:r>
+            <a:r>
+              <a:rPr lang="en-US" dirty="0" err="1">
+                <a:cs typeface="Calibri"/>
+              </a:rPr>
+              <a:t>datos</a:t>
+            </a:r>
+            <a:r>
+              <a:rPr lang="en-US" dirty="0">
+                <a:cs typeface="Calibri"/>
+              </a:rPr>
+              <a:t>, </a:t>
+            </a:r>
+            <a:r>
+              <a:rPr lang="en-US" dirty="0" err="1">
+                <a:cs typeface="Calibri"/>
+              </a:rPr>
+              <a:t>tenemos</a:t>
+            </a:r>
+            <a:r>
+              <a:rPr lang="en-US" dirty="0">
+                <a:cs typeface="Calibri"/>
+              </a:rPr>
+              <a:t> </a:t>
+            </a:r>
+            <a:r>
+              <a:rPr lang="en-US" dirty="0" err="1">
+                <a:cs typeface="Calibri"/>
+              </a:rPr>
+              <a:t>datos</a:t>
+            </a:r>
+            <a:r>
+              <a:rPr lang="en-US" dirty="0">
+                <a:cs typeface="Calibri"/>
+              </a:rPr>
+              <a:t> de </a:t>
+            </a:r>
+            <a:r>
+              <a:rPr lang="en-US" dirty="0" err="1">
+                <a:cs typeface="Calibri"/>
+              </a:rPr>
+              <a:t>tipo</a:t>
+            </a:r>
+            <a:r>
+              <a:rPr lang="en-US" dirty="0">
+                <a:cs typeface="Calibri"/>
+              </a:rPr>
+              <a:t> </a:t>
+            </a:r>
+            <a:r>
+              <a:rPr lang="en-US" dirty="0" err="1">
+                <a:cs typeface="Calibri"/>
+              </a:rPr>
+              <a:t>texto</a:t>
+            </a:r>
+            <a:r>
+              <a:rPr lang="en-US" dirty="0">
+                <a:cs typeface="Calibri"/>
+              </a:rPr>
+              <a:t> y </a:t>
+            </a:r>
+            <a:r>
+              <a:rPr lang="en-US" dirty="0" err="1">
+                <a:cs typeface="Calibri"/>
+              </a:rPr>
+              <a:t>numéricos</a:t>
+            </a:r>
+            <a:r>
+              <a:rPr lang="en-US" dirty="0">
+                <a:cs typeface="Calibri"/>
+              </a:rPr>
+              <a:t> (</a:t>
+            </a:r>
+            <a:r>
+              <a:rPr lang="en-US" dirty="0" err="1">
+                <a:cs typeface="Calibri"/>
+              </a:rPr>
+              <a:t>enteros</a:t>
+            </a:r>
+            <a:r>
+              <a:rPr lang="en-US" dirty="0">
+                <a:cs typeface="Calibri"/>
+              </a:rPr>
+              <a:t> y </a:t>
+            </a:r>
+            <a:r>
+              <a:rPr lang="en-US" dirty="0" err="1">
+                <a:cs typeface="Calibri"/>
+              </a:rPr>
+              <a:t>reales</a:t>
+            </a:r>
+            <a:r>
+              <a:rPr lang="en-US" dirty="0">
+                <a:cs typeface="Calibri"/>
+              </a:rPr>
+              <a:t>)</a:t>
+            </a:r>
+          </a:p>
+          <a:p>
+            <a:endParaRPr lang="en-US" dirty="0">
+              <a:cs typeface="Calibri"/>
+            </a:endParaRPr>
+          </a:p>
+          <a:p>
+            <a:endParaRPr lang="en-US" dirty="0">
+              <a:cs typeface="Calibri"/>
+            </a:endParaRPr>
+          </a:p>
+          <a:p>
+            <a:endParaRPr lang="en-US" dirty="0">
+              <a:cs typeface="Calibri"/>
+            </a:endParaRPr>
           </a:p>
         </p:txBody>
       </p:sp>
@@ -2377,13 +4235,6 @@
   <p:clrMapOvr>
     <a:masterClrMapping/>
   </p:clrMapOvr>
-  <p:timing>
-    <p:tnLst>
-      <p:par>
-        <p:cTn id="1" dur="indefinite" restart="never" nodeType="tmRoot"/>
-      </p:par>
-    </p:tnLst>
-  </p:timing>
 </p:sld>
 </file>
 
@@ -2433,32 +4284,432 @@
             <p:ph idx="1"/>
           </p:nvPr>
         </p:nvSpPr>
-        <p:spPr/>
+        <p:spPr>
+          <a:xfrm>
+            <a:off x="838200" y="1911889"/>
+            <a:ext cx="10515600" cy="4265074"/>
+          </a:xfrm>
+        </p:spPr>
         <p:txBody>
-          <a:bodyPr/>
+          <a:bodyPr anchor="t"/>
           <a:lstStyle/>
           <a:p>
+            <a:r>
+              <a:rPr lang="en-US" dirty="0" err="1">
+                <a:cs typeface="Calibri"/>
+              </a:rPr>
+              <a:t>Análisis</a:t>
+            </a:r>
+            <a:r>
+              <a:rPr lang="en-US" dirty="0">
+                <a:cs typeface="Calibri"/>
+              </a:rPr>
+              <a:t> </a:t>
+            </a:r>
+            <a:r>
+              <a:rPr lang="en-US" dirty="0" err="1">
+                <a:cs typeface="Calibri"/>
+              </a:rPr>
+              <a:t>estructural</a:t>
+            </a:r>
+            <a:r>
+              <a:rPr lang="en-US" dirty="0">
+                <a:cs typeface="Calibri"/>
+              </a:rPr>
+              <a:t> de los </a:t>
+            </a:r>
+            <a:r>
+              <a:rPr lang="en-US" dirty="0" err="1">
+                <a:cs typeface="Calibri"/>
+              </a:rPr>
+              <a:t>datos</a:t>
+            </a:r>
+            <a:endParaRPr lang="en-US" dirty="0">
+              <a:cs typeface="Calibri"/>
+            </a:endParaRPr>
+          </a:p>
+          <a:p>
+            <a:endParaRPr lang="en-US" dirty="0">
+              <a:cs typeface="Calibri"/>
+            </a:endParaRPr>
+          </a:p>
+          <a:p>
+            <a:r>
+              <a:rPr lang="en-US" dirty="0">
+                <a:cs typeface="Calibri"/>
+              </a:rPr>
+              <a:t>Entre los </a:t>
+            </a:r>
+            <a:r>
+              <a:rPr lang="en-US" dirty="0" err="1">
+                <a:cs typeface="Calibri"/>
+              </a:rPr>
+              <a:t>datos</a:t>
+            </a:r>
+            <a:r>
+              <a:rPr lang="en-US" dirty="0">
+                <a:cs typeface="Calibri"/>
+              </a:rPr>
+              <a:t> de </a:t>
+            </a:r>
+            <a:r>
+              <a:rPr lang="en-US" dirty="0" err="1">
+                <a:cs typeface="Calibri"/>
+              </a:rPr>
+              <a:t>tipo</a:t>
+            </a:r>
+            <a:r>
+              <a:rPr lang="en-US" dirty="0">
+                <a:cs typeface="Calibri"/>
+              </a:rPr>
+              <a:t> </a:t>
+            </a:r>
+            <a:r>
+              <a:rPr lang="en-US" dirty="0" err="1">
+                <a:cs typeface="Calibri"/>
+              </a:rPr>
+              <a:t>texto</a:t>
+            </a:r>
+            <a:r>
+              <a:rPr lang="en-US" dirty="0">
+                <a:cs typeface="Calibri"/>
+              </a:rPr>
+              <a:t>, hay </a:t>
+            </a:r>
+            <a:r>
+              <a:rPr lang="en-US" dirty="0" err="1">
+                <a:cs typeface="Calibri"/>
+              </a:rPr>
+              <a:t>algunos</a:t>
+            </a:r>
+            <a:r>
+              <a:rPr lang="en-US" dirty="0">
+                <a:cs typeface="Calibri"/>
+              </a:rPr>
+              <a:t> que </a:t>
+            </a:r>
+            <a:r>
+              <a:rPr lang="en-US" dirty="0" err="1">
+                <a:cs typeface="Calibri"/>
+              </a:rPr>
+              <a:t>corresponden</a:t>
+            </a:r>
+            <a:r>
+              <a:rPr lang="en-US" dirty="0">
+                <a:cs typeface="Calibri"/>
+              </a:rPr>
+              <a:t> a </a:t>
+            </a:r>
+            <a:r>
+              <a:rPr lang="en-US" dirty="0" err="1">
+                <a:cs typeface="Calibri"/>
+              </a:rPr>
+              <a:t>datos</a:t>
+            </a:r>
+            <a:r>
+              <a:rPr lang="en-US" dirty="0">
+                <a:cs typeface="Calibri"/>
+              </a:rPr>
+              <a:t> </a:t>
+            </a:r>
+            <a:r>
+              <a:rPr lang="en-US" dirty="0" err="1">
+                <a:cs typeface="Calibri"/>
+              </a:rPr>
+              <a:t>cualitativos</a:t>
+            </a:r>
+            <a:r>
+              <a:rPr lang="en-US" dirty="0">
+                <a:cs typeface="Calibri"/>
+              </a:rPr>
+              <a:t>, </a:t>
+            </a:r>
+            <a:r>
+              <a:rPr lang="en-US" dirty="0" err="1">
+                <a:cs typeface="Calibri"/>
+              </a:rPr>
+              <a:t>esto</a:t>
+            </a:r>
+            <a:r>
+              <a:rPr lang="en-US" dirty="0">
+                <a:cs typeface="Calibri"/>
+              </a:rPr>
+              <a:t> es, </a:t>
+            </a:r>
+            <a:r>
+              <a:rPr lang="en-US" dirty="0" err="1">
+                <a:cs typeface="Calibri"/>
+              </a:rPr>
+              <a:t>datos</a:t>
+            </a:r>
+            <a:r>
+              <a:rPr lang="en-US" dirty="0">
+                <a:cs typeface="Calibri"/>
+              </a:rPr>
+              <a:t> que </a:t>
+            </a:r>
+            <a:r>
+              <a:rPr lang="en-US" dirty="0" err="1">
+                <a:cs typeface="Calibri"/>
+              </a:rPr>
+              <a:t>nos</a:t>
+            </a:r>
+            <a:r>
+              <a:rPr lang="en-US" dirty="0">
+                <a:cs typeface="Calibri"/>
+              </a:rPr>
+              <a:t> </a:t>
+            </a:r>
+            <a:r>
+              <a:rPr lang="en-US" dirty="0" err="1">
+                <a:cs typeface="Calibri"/>
+              </a:rPr>
+              <a:t>permiten</a:t>
+            </a:r>
+            <a:r>
+              <a:rPr lang="en-US" dirty="0">
+                <a:cs typeface="Calibri"/>
+              </a:rPr>
+              <a:t> </a:t>
+            </a:r>
+            <a:r>
+              <a:rPr lang="en-US" dirty="0" err="1">
+                <a:cs typeface="Calibri"/>
+              </a:rPr>
+              <a:t>etiquetar</a:t>
+            </a:r>
+            <a:r>
+              <a:rPr lang="en-US" dirty="0">
+                <a:cs typeface="Calibri"/>
+              </a:rPr>
+              <a:t> y </a:t>
+            </a:r>
+            <a:r>
+              <a:rPr lang="en-US" dirty="0" err="1">
+                <a:cs typeface="Calibri"/>
+              </a:rPr>
+              <a:t>también</a:t>
+            </a:r>
+            <a:r>
+              <a:rPr lang="en-US" dirty="0">
+                <a:cs typeface="Calibri"/>
+              </a:rPr>
+              <a:t> </a:t>
+            </a:r>
+            <a:r>
+              <a:rPr lang="en-US" dirty="0" err="1">
+                <a:cs typeface="Calibri"/>
+              </a:rPr>
+              <a:t>agrupar</a:t>
+            </a:r>
+            <a:r>
+              <a:rPr lang="en-US" dirty="0">
+                <a:cs typeface="Calibri"/>
+              </a:rPr>
+              <a:t> el resto de los </a:t>
+            </a:r>
+            <a:r>
+              <a:rPr lang="en-US" dirty="0" err="1">
+                <a:cs typeface="Calibri"/>
+              </a:rPr>
+              <a:t>datos</a:t>
+            </a:r>
+            <a:r>
+              <a:rPr lang="en-US" dirty="0">
+                <a:cs typeface="Calibri"/>
+              </a:rPr>
+              <a:t> para </a:t>
+            </a:r>
+            <a:r>
+              <a:rPr lang="en-US" dirty="0" err="1">
+                <a:cs typeface="Calibri"/>
+              </a:rPr>
+              <a:t>poder</a:t>
+            </a:r>
+            <a:r>
+              <a:rPr lang="en-US" dirty="0">
+                <a:cs typeface="Calibri"/>
+              </a:rPr>
+              <a:t> </a:t>
+            </a:r>
+            <a:r>
+              <a:rPr lang="en-US" dirty="0" err="1">
+                <a:cs typeface="Calibri"/>
+              </a:rPr>
+              <a:t>hacer</a:t>
+            </a:r>
+            <a:r>
+              <a:rPr lang="en-US" dirty="0">
+                <a:cs typeface="Calibri"/>
+              </a:rPr>
+              <a:t> </a:t>
+            </a:r>
+            <a:r>
+              <a:rPr lang="en-US" dirty="0" err="1">
+                <a:cs typeface="Calibri"/>
+              </a:rPr>
+              <a:t>distintos</a:t>
+            </a:r>
+            <a:r>
+              <a:rPr lang="en-US" dirty="0">
+                <a:cs typeface="Calibri"/>
+              </a:rPr>
+              <a:t> </a:t>
+            </a:r>
+            <a:r>
+              <a:rPr lang="en-US" dirty="0" err="1">
+                <a:cs typeface="Calibri"/>
+              </a:rPr>
+              <a:t>análisis</a:t>
+            </a:r>
+            <a:r>
+              <a:rPr lang="en-US" dirty="0">
+                <a:cs typeface="Calibri"/>
+              </a:rPr>
+              <a:t>.</a:t>
+            </a:r>
             <a:endParaRPr lang="en-US" dirty="0"/>
+          </a:p>
+          <a:p>
+            <a:r>
+              <a:rPr lang="en-US" dirty="0">
+                <a:cs typeface="Calibri"/>
+              </a:rPr>
+              <a:t>Entre </a:t>
+            </a:r>
+            <a:r>
+              <a:rPr lang="en-US" dirty="0" err="1">
+                <a:cs typeface="Calibri"/>
+              </a:rPr>
+              <a:t>estos</a:t>
+            </a:r>
+            <a:r>
+              <a:rPr lang="en-US" dirty="0">
+                <a:cs typeface="Calibri"/>
+              </a:rPr>
+              <a:t> </a:t>
+            </a:r>
+            <a:r>
+              <a:rPr lang="en-US" dirty="0" err="1">
+                <a:cs typeface="Calibri"/>
+              </a:rPr>
+              <a:t>tipos</a:t>
+            </a:r>
+            <a:r>
+              <a:rPr lang="en-US" dirty="0">
+                <a:cs typeface="Calibri"/>
+              </a:rPr>
+              <a:t> de </a:t>
+            </a:r>
+            <a:r>
+              <a:rPr lang="en-US" dirty="0" err="1">
+                <a:cs typeface="Calibri"/>
+              </a:rPr>
+              <a:t>datos</a:t>
+            </a:r>
+            <a:r>
+              <a:rPr lang="en-US" dirty="0">
+                <a:cs typeface="Calibri"/>
+              </a:rPr>
+              <a:t> </a:t>
+            </a:r>
+            <a:r>
+              <a:rPr lang="en-US" dirty="0" err="1">
+                <a:cs typeface="Calibri"/>
+              </a:rPr>
+              <a:t>tenemos</a:t>
+            </a:r>
+            <a:r>
+              <a:rPr lang="en-US" dirty="0">
+                <a:cs typeface="Calibri"/>
+              </a:rPr>
+              <a:t> por </a:t>
+            </a:r>
+            <a:r>
+              <a:rPr lang="en-US" dirty="0" err="1">
+                <a:cs typeface="Calibri"/>
+              </a:rPr>
+              <a:t>ej</a:t>
+            </a:r>
+            <a:r>
+              <a:rPr lang="en-US" dirty="0">
+                <a:cs typeface="Calibri"/>
+              </a:rPr>
+              <a:t>.: operation, </a:t>
+            </a:r>
+            <a:r>
+              <a:rPr lang="en-US" dirty="0" err="1">
+                <a:cs typeface="Calibri"/>
+              </a:rPr>
+              <a:t>property_type</a:t>
+            </a:r>
+            <a:r>
+              <a:rPr lang="en-US" dirty="0">
+                <a:cs typeface="Calibri"/>
+              </a:rPr>
+              <a:t>, </a:t>
+            </a:r>
+            <a:r>
+              <a:rPr lang="en-US" dirty="0" err="1">
+                <a:cs typeface="Calibri"/>
+              </a:rPr>
+              <a:t>country_name</a:t>
+            </a:r>
+            <a:r>
+              <a:rPr lang="en-US" dirty="0">
+                <a:cs typeface="Calibri"/>
+              </a:rPr>
+              <a:t>, </a:t>
+            </a:r>
+            <a:r>
+              <a:rPr lang="en-US" dirty="0" err="1">
+                <a:cs typeface="Calibri"/>
+              </a:rPr>
+              <a:t>state_name</a:t>
+            </a:r>
+            <a:r>
+              <a:rPr lang="en-US" dirty="0">
+                <a:cs typeface="Calibri"/>
+              </a:rPr>
+              <a:t>, </a:t>
+            </a:r>
+            <a:r>
+              <a:rPr lang="en-US" dirty="0" err="1">
+                <a:cs typeface="Calibri"/>
+              </a:rPr>
+              <a:t>place_name</a:t>
+            </a:r>
+            <a:endParaRPr lang="en-US" dirty="0">
+              <a:cs typeface="Calibri"/>
+            </a:endParaRPr>
+          </a:p>
+          <a:p>
+            <a:endParaRPr lang="en-US" dirty="0">
+              <a:cs typeface="Calibri"/>
+            </a:endParaRPr>
+          </a:p>
+          <a:p>
+            <a:endParaRPr lang="en-US" dirty="0">
+              <a:cs typeface="Calibri"/>
+            </a:endParaRPr>
+          </a:p>
+          <a:p>
+            <a:endParaRPr lang="en-US" dirty="0">
+              <a:cs typeface="Calibri"/>
+            </a:endParaRPr>
           </a:p>
         </p:txBody>
       </p:sp>
     </p:spTree>
     <p:extLst>
       <p:ext uri="{BB962C8B-B14F-4D97-AF65-F5344CB8AC3E}">
-        <p14:creationId xmlns:p14="http://schemas.microsoft.com/office/powerpoint/2010/main" val="1695492761"/>
+        <p14:creationId xmlns:p14="http://schemas.microsoft.com/office/powerpoint/2010/main" val="713099255"/>
       </p:ext>
     </p:extLst>
   </p:cSld>
   <p:clrMapOvr>
     <a:masterClrMapping/>
   </p:clrMapOvr>
-  <p:timing>
-    <p:tnLst>
-      <p:par>
-        <p:cTn id="1" dur="indefinite" restart="never" nodeType="tmRoot"/>
-      </p:par>
-    </p:tnLst>
-  </p:timing>
 </p:sld>
 </file>
 
@@ -2510,30 +4761,480 @@
         </p:nvSpPr>
         <p:spPr/>
         <p:txBody>
-          <a:bodyPr/>
+          <a:bodyPr anchor="t"/>
           <a:lstStyle/>
           <a:p>
-            <a:endParaRPr lang="en-US"/>
+            <a:r>
+              <a:rPr lang="en-US" dirty="0" err="1">
+                <a:cs typeface="Calibri"/>
+              </a:rPr>
+              <a:t>Completitud</a:t>
+            </a:r>
+            <a:r>
+              <a:rPr lang="en-US" dirty="0">
+                <a:cs typeface="Calibri"/>
+              </a:rPr>
+              <a:t> de los </a:t>
+            </a:r>
+            <a:r>
+              <a:rPr lang="en-US" dirty="0" err="1">
+                <a:cs typeface="Calibri"/>
+              </a:rPr>
+              <a:t>datos</a:t>
+            </a:r>
+            <a:endParaRPr lang="en-US">
+              <a:cs typeface="Calibri"/>
+            </a:endParaRPr>
+          </a:p>
+          <a:p>
+            <a:endParaRPr lang="en-US" dirty="0">
+              <a:cs typeface="Calibri" panose="020F0502020204030204"/>
+            </a:endParaRPr>
+          </a:p>
+          <a:p>
+            <a:r>
+              <a:rPr lang="en-US" dirty="0" err="1">
+                <a:cs typeface="Calibri" panose="020F0502020204030204"/>
+              </a:rPr>
+              <a:t>Hallamos</a:t>
+            </a:r>
+            <a:r>
+              <a:rPr lang="en-US" dirty="0">
+                <a:cs typeface="Calibri" panose="020F0502020204030204"/>
+              </a:rPr>
+              <a:t> que los </a:t>
+            </a:r>
+            <a:r>
+              <a:rPr lang="en-US" dirty="0" err="1">
+                <a:cs typeface="Calibri" panose="020F0502020204030204"/>
+              </a:rPr>
+              <a:t>datos</a:t>
+            </a:r>
+            <a:r>
+              <a:rPr lang="en-US" dirty="0">
+                <a:cs typeface="Calibri" panose="020F0502020204030204"/>
+              </a:rPr>
+              <a:t> </a:t>
+            </a:r>
+            <a:r>
+              <a:rPr lang="en-US" dirty="0" err="1">
+                <a:cs typeface="Calibri" panose="020F0502020204030204"/>
+              </a:rPr>
+              <a:t>correspondientes</a:t>
+            </a:r>
+            <a:r>
+              <a:rPr lang="en-US" dirty="0">
+                <a:cs typeface="Calibri" panose="020F0502020204030204"/>
+              </a:rPr>
+              <a:t> al </a:t>
+            </a:r>
+            <a:r>
+              <a:rPr lang="en-US" dirty="0" err="1">
+                <a:cs typeface="Calibri" panose="020F0502020204030204"/>
+              </a:rPr>
+              <a:t>tipo</a:t>
+            </a:r>
+            <a:r>
+              <a:rPr lang="en-US" dirty="0">
+                <a:cs typeface="Calibri" panose="020F0502020204030204"/>
+              </a:rPr>
+              <a:t> de </a:t>
+            </a:r>
+            <a:r>
+              <a:rPr lang="en-US" dirty="0" err="1">
+                <a:cs typeface="Calibri" panose="020F0502020204030204"/>
+              </a:rPr>
+              <a:t>dato</a:t>
+            </a:r>
+            <a:r>
+              <a:rPr lang="en-US" dirty="0">
+                <a:cs typeface="Calibri" panose="020F0502020204030204"/>
+              </a:rPr>
+              <a:t> </a:t>
+            </a:r>
+            <a:r>
+              <a:rPr lang="en-US" dirty="0" err="1">
+                <a:cs typeface="Calibri" panose="020F0502020204030204"/>
+              </a:rPr>
+              <a:t>texto</a:t>
+            </a:r>
+            <a:r>
+              <a:rPr lang="en-US" dirty="0">
+                <a:cs typeface="Calibri" panose="020F0502020204030204"/>
+              </a:rPr>
+              <a:t> </a:t>
+            </a:r>
+            <a:r>
+              <a:rPr lang="en-US" dirty="0" err="1">
+                <a:cs typeface="Calibri" panose="020F0502020204030204"/>
+              </a:rPr>
+              <a:t>tenían</a:t>
+            </a:r>
+            <a:r>
+              <a:rPr lang="en-US" dirty="0">
+                <a:cs typeface="Calibri" panose="020F0502020204030204"/>
+              </a:rPr>
+              <a:t> un alto </a:t>
+            </a:r>
+            <a:r>
+              <a:rPr lang="en-US" dirty="0" err="1">
+                <a:cs typeface="Calibri" panose="020F0502020204030204"/>
+              </a:rPr>
+              <a:t>grado</a:t>
+            </a:r>
+            <a:r>
+              <a:rPr lang="en-US" dirty="0">
+                <a:cs typeface="Calibri" panose="020F0502020204030204"/>
+              </a:rPr>
+              <a:t> de </a:t>
+            </a:r>
+            <a:r>
+              <a:rPr lang="en-US" dirty="0" err="1">
+                <a:cs typeface="Calibri" panose="020F0502020204030204"/>
+              </a:rPr>
+              <a:t>completitud</a:t>
+            </a:r>
+            <a:r>
+              <a:rPr lang="en-US" dirty="0">
+                <a:cs typeface="Calibri" panose="020F0502020204030204"/>
+              </a:rPr>
+              <a:t> (superior al 95% en </a:t>
+            </a:r>
+            <a:r>
+              <a:rPr lang="en-US" dirty="0" err="1">
+                <a:cs typeface="Calibri" panose="020F0502020204030204"/>
+              </a:rPr>
+              <a:t>todos</a:t>
+            </a:r>
+            <a:r>
+              <a:rPr lang="en-US" dirty="0">
+                <a:cs typeface="Calibri" panose="020F0502020204030204"/>
+              </a:rPr>
+              <a:t> los </a:t>
+            </a:r>
+            <a:r>
+              <a:rPr lang="en-US" dirty="0" err="1">
+                <a:cs typeface="Calibri" panose="020F0502020204030204"/>
+              </a:rPr>
+              <a:t>casos</a:t>
+            </a:r>
+            <a:r>
+              <a:rPr lang="en-US" dirty="0">
+                <a:cs typeface="Calibri" panose="020F0502020204030204"/>
+              </a:rPr>
+              <a:t>)</a:t>
+            </a:r>
+          </a:p>
+          <a:p>
+            <a:r>
+              <a:rPr lang="en-US" dirty="0">
+                <a:cs typeface="Calibri" panose="020F0502020204030204"/>
+              </a:rPr>
+              <a:t>La mayor </a:t>
+            </a:r>
+            <a:r>
+              <a:rPr lang="en-US" dirty="0" err="1">
+                <a:cs typeface="Calibri" panose="020F0502020204030204"/>
+              </a:rPr>
+              <a:t>parte</a:t>
+            </a:r>
+            <a:r>
+              <a:rPr lang="en-US" dirty="0">
+                <a:cs typeface="Calibri" panose="020F0502020204030204"/>
+              </a:rPr>
+              <a:t> de </a:t>
+            </a:r>
+            <a:r>
+              <a:rPr lang="en-US" dirty="0" err="1">
+                <a:cs typeface="Calibri" panose="020F0502020204030204"/>
+              </a:rPr>
+              <a:t>faltantes</a:t>
+            </a:r>
+            <a:r>
+              <a:rPr lang="en-US" dirty="0">
+                <a:cs typeface="Calibri" panose="020F0502020204030204"/>
+              </a:rPr>
+              <a:t> se </a:t>
+            </a:r>
+            <a:r>
+              <a:rPr lang="en-US" dirty="0" err="1">
+                <a:cs typeface="Calibri" panose="020F0502020204030204"/>
+              </a:rPr>
+              <a:t>daban</a:t>
+            </a:r>
+            <a:r>
+              <a:rPr lang="en-US" dirty="0">
+                <a:cs typeface="Calibri" panose="020F0502020204030204"/>
+              </a:rPr>
+              <a:t> en los </a:t>
+            </a:r>
+            <a:r>
+              <a:rPr lang="en-US" dirty="0" err="1">
+                <a:cs typeface="Calibri" panose="020F0502020204030204"/>
+              </a:rPr>
+              <a:t>campos</a:t>
+            </a:r>
+            <a:r>
+              <a:rPr lang="en-US" dirty="0">
+                <a:cs typeface="Calibri" panose="020F0502020204030204"/>
+              </a:rPr>
+              <a:t> </a:t>
+            </a:r>
+            <a:r>
+              <a:rPr lang="en-US" dirty="0" err="1">
+                <a:cs typeface="Calibri" panose="020F0502020204030204"/>
+              </a:rPr>
+              <a:t>númericos</a:t>
+            </a:r>
+            <a:r>
+              <a:rPr lang="en-US" dirty="0">
+                <a:cs typeface="Calibri" panose="020F0502020204030204"/>
+              </a:rPr>
+              <a:t>.</a:t>
+            </a:r>
+          </a:p>
+          <a:p>
+            <a:r>
+              <a:rPr lang="en-US" dirty="0" err="1">
+                <a:cs typeface="Calibri" panose="020F0502020204030204"/>
+              </a:rPr>
+              <a:t>Esto</a:t>
+            </a:r>
+            <a:r>
+              <a:rPr lang="en-US" dirty="0">
+                <a:cs typeface="Calibri" panose="020F0502020204030204"/>
+              </a:rPr>
+              <a:t> </a:t>
+            </a:r>
+            <a:r>
+              <a:rPr lang="en-US" dirty="0" err="1">
+                <a:cs typeface="Calibri" panose="020F0502020204030204"/>
+              </a:rPr>
+              <a:t>último</a:t>
+            </a:r>
+            <a:r>
+              <a:rPr lang="en-US" dirty="0">
+                <a:cs typeface="Calibri" panose="020F0502020204030204"/>
+              </a:rPr>
+              <a:t> </a:t>
+            </a:r>
+            <a:r>
+              <a:rPr lang="en-US" dirty="0" err="1">
+                <a:cs typeface="Calibri" panose="020F0502020204030204"/>
+              </a:rPr>
+              <a:t>resulta</a:t>
+            </a:r>
+            <a:r>
+              <a:rPr lang="en-US" dirty="0">
+                <a:cs typeface="Calibri" panose="020F0502020204030204"/>
+              </a:rPr>
+              <a:t> </a:t>
+            </a:r>
+            <a:r>
+              <a:rPr lang="en-US" dirty="0" err="1">
+                <a:cs typeface="Calibri" panose="020F0502020204030204"/>
+              </a:rPr>
+              <a:t>problemático</a:t>
+            </a:r>
+            <a:r>
+              <a:rPr lang="en-US" dirty="0">
+                <a:cs typeface="Calibri" panose="020F0502020204030204"/>
+              </a:rPr>
+              <a:t> para la </a:t>
+            </a:r>
+            <a:r>
+              <a:rPr lang="en-US" dirty="0" err="1">
+                <a:cs typeface="Calibri" panose="020F0502020204030204"/>
+              </a:rPr>
+              <a:t>finalidad</a:t>
+            </a:r>
+            <a:r>
+              <a:rPr lang="en-US" dirty="0">
+                <a:cs typeface="Calibri" panose="020F0502020204030204"/>
+              </a:rPr>
+              <a:t> del </a:t>
+            </a:r>
+            <a:r>
+              <a:rPr lang="en-US" dirty="0" err="1">
+                <a:cs typeface="Calibri" panose="020F0502020204030204"/>
+              </a:rPr>
+              <a:t>proyecto</a:t>
+            </a:r>
+            <a:r>
+              <a:rPr lang="en-US" dirty="0">
+                <a:cs typeface="Calibri" panose="020F0502020204030204"/>
+              </a:rPr>
+              <a:t> </a:t>
+            </a:r>
+            <a:r>
+              <a:rPr lang="en-US" dirty="0" err="1">
+                <a:cs typeface="Calibri" panose="020F0502020204030204"/>
+              </a:rPr>
+              <a:t>ya</a:t>
+            </a:r>
+            <a:r>
+              <a:rPr lang="en-US" dirty="0">
+                <a:cs typeface="Calibri" panose="020F0502020204030204"/>
+              </a:rPr>
+              <a:t> que con </a:t>
+            </a:r>
+            <a:r>
+              <a:rPr lang="en-US" dirty="0" err="1">
+                <a:cs typeface="Calibri" panose="020F0502020204030204"/>
+              </a:rPr>
+              <a:t>pocos</a:t>
+            </a:r>
+            <a:r>
+              <a:rPr lang="en-US" dirty="0">
+                <a:cs typeface="Calibri" panose="020F0502020204030204"/>
+              </a:rPr>
+              <a:t> </a:t>
+            </a:r>
+            <a:r>
+              <a:rPr lang="en-US" dirty="0" err="1">
+                <a:cs typeface="Calibri" panose="020F0502020204030204"/>
+              </a:rPr>
+              <a:t>datos</a:t>
+            </a:r>
+            <a:r>
+              <a:rPr lang="en-US" dirty="0">
+                <a:cs typeface="Calibri" panose="020F0502020204030204"/>
+              </a:rPr>
+              <a:t> de </a:t>
+            </a:r>
+            <a:r>
+              <a:rPr lang="en-US" dirty="0" err="1">
+                <a:cs typeface="Calibri" panose="020F0502020204030204"/>
+              </a:rPr>
+              <a:t>precios</a:t>
+            </a:r>
+            <a:r>
+              <a:rPr lang="en-US" dirty="0">
+                <a:cs typeface="Calibri" panose="020F0502020204030204"/>
+              </a:rPr>
+              <a:t>, no </a:t>
+            </a:r>
+            <a:r>
+              <a:rPr lang="en-US" dirty="0" err="1">
+                <a:cs typeface="Calibri" panose="020F0502020204030204"/>
+              </a:rPr>
+              <a:t>será</a:t>
+            </a:r>
+            <a:r>
+              <a:rPr lang="en-US" dirty="0">
+                <a:cs typeface="Calibri" panose="020F0502020204030204"/>
+              </a:rPr>
+              <a:t> </a:t>
+            </a:r>
+            <a:r>
+              <a:rPr lang="en-US" dirty="0" err="1">
+                <a:cs typeface="Calibri" panose="020F0502020204030204"/>
+              </a:rPr>
+              <a:t>posible</a:t>
+            </a:r>
+            <a:r>
+              <a:rPr lang="en-US" dirty="0">
+                <a:cs typeface="Calibri" panose="020F0502020204030204"/>
+              </a:rPr>
+              <a:t> </a:t>
+            </a:r>
+            <a:r>
+              <a:rPr lang="en-US" dirty="0" err="1">
+                <a:cs typeface="Calibri" panose="020F0502020204030204"/>
+              </a:rPr>
+              <a:t>poder</a:t>
+            </a:r>
+            <a:r>
+              <a:rPr lang="en-US" dirty="0">
+                <a:cs typeface="Calibri" panose="020F0502020204030204"/>
+              </a:rPr>
+              <a:t> </a:t>
+            </a:r>
+            <a:r>
+              <a:rPr lang="en-US" dirty="0" err="1">
+                <a:cs typeface="Calibri" panose="020F0502020204030204"/>
+              </a:rPr>
+              <a:t>predecir</a:t>
+            </a:r>
+            <a:r>
+              <a:rPr lang="en-US" dirty="0">
+                <a:cs typeface="Calibri" panose="020F0502020204030204"/>
+              </a:rPr>
+              <a:t> con </a:t>
+            </a:r>
+            <a:r>
+              <a:rPr lang="en-US" dirty="0" err="1">
+                <a:cs typeface="Calibri" panose="020F0502020204030204"/>
+              </a:rPr>
+              <a:t>mucha</a:t>
+            </a:r>
+            <a:r>
+              <a:rPr lang="en-US" dirty="0">
+                <a:cs typeface="Calibri" panose="020F0502020204030204"/>
+              </a:rPr>
+              <a:t> </a:t>
+            </a:r>
+            <a:r>
+              <a:rPr lang="en-US" dirty="0" err="1">
+                <a:cs typeface="Calibri" panose="020F0502020204030204"/>
+              </a:rPr>
+              <a:t>precisión</a:t>
+            </a:r>
+            <a:r>
+              <a:rPr lang="en-US" dirty="0">
+                <a:cs typeface="Calibri" panose="020F0502020204030204"/>
+              </a:rPr>
+              <a:t> el </a:t>
+            </a:r>
+            <a:r>
+              <a:rPr lang="en-US" dirty="0" err="1">
+                <a:cs typeface="Calibri" panose="020F0502020204030204"/>
+              </a:rPr>
+              <a:t>precio</a:t>
+            </a:r>
+            <a:r>
+              <a:rPr lang="en-US" dirty="0">
+                <a:cs typeface="Calibri" panose="020F0502020204030204"/>
+              </a:rPr>
+              <a:t> por el metro </a:t>
+            </a:r>
+            <a:r>
+              <a:rPr lang="en-US" dirty="0" err="1">
+                <a:cs typeface="Calibri" panose="020F0502020204030204"/>
+              </a:rPr>
+              <a:t>cuadrado</a:t>
+            </a:r>
+            <a:r>
+              <a:rPr lang="en-US" dirty="0">
+                <a:cs typeface="Calibri" panose="020F0502020204030204"/>
+              </a:rPr>
+              <a:t> para una </a:t>
+            </a:r>
+            <a:r>
+              <a:rPr lang="en-US" dirty="0" err="1">
+                <a:cs typeface="Calibri" panose="020F0502020204030204"/>
+              </a:rPr>
+              <a:t>propiedad</a:t>
+            </a:r>
+            <a:r>
+              <a:rPr lang="en-US" dirty="0">
+                <a:cs typeface="Calibri" panose="020F0502020204030204"/>
+              </a:rPr>
+              <a:t>.</a:t>
+            </a:r>
           </a:p>
         </p:txBody>
       </p:sp>
     </p:spTree>
     <p:extLst>
       <p:ext uri="{BB962C8B-B14F-4D97-AF65-F5344CB8AC3E}">
-        <p14:creationId xmlns:p14="http://schemas.microsoft.com/office/powerpoint/2010/main" val="3583675036"/>
+        <p14:creationId xmlns:p14="http://schemas.microsoft.com/office/powerpoint/2010/main" val="1695492761"/>
       </p:ext>
     </p:extLst>
   </p:cSld>
   <p:clrMapOvr>
     <a:masterClrMapping/>
   </p:clrMapOvr>
-  <p:timing>
-    <p:tnLst>
-      <p:par>
-        <p:cTn id="1" dur="indefinite" restart="never" nodeType="tmRoot"/>
-      </p:par>
-    </p:tnLst>
-  </p:timing>
 </p:sld>
 </file>
 
@@ -2585,30 +5286,400 @@
         </p:nvSpPr>
         <p:spPr/>
         <p:txBody>
-          <a:bodyPr/>
+          <a:bodyPr anchor="t"/>
           <a:lstStyle/>
           <a:p>
-            <a:endParaRPr lang="en-US"/>
+            <a:r>
+              <a:rPr lang="en-US" dirty="0">
+                <a:cs typeface="Calibri"/>
+              </a:rPr>
+              <a:t>Como resolver el </a:t>
+            </a:r>
+            <a:r>
+              <a:rPr lang="en-US" dirty="0" err="1">
+                <a:cs typeface="Calibri"/>
+              </a:rPr>
+              <a:t>problema</a:t>
+            </a:r>
+            <a:r>
+              <a:rPr lang="en-US" dirty="0">
+                <a:cs typeface="Calibri"/>
+              </a:rPr>
+              <a:t> de la </a:t>
+            </a:r>
+            <a:r>
+              <a:rPr lang="en-US" dirty="0" err="1">
+                <a:cs typeface="Calibri"/>
+              </a:rPr>
+              <a:t>falta</a:t>
+            </a:r>
+            <a:r>
+              <a:rPr lang="en-US" dirty="0">
+                <a:cs typeface="Calibri"/>
+              </a:rPr>
+              <a:t> de </a:t>
+            </a:r>
+            <a:r>
+              <a:rPr lang="en-US" dirty="0" err="1">
+                <a:cs typeface="Calibri"/>
+              </a:rPr>
+              <a:t>datos</a:t>
+            </a:r>
+            <a:endParaRPr lang="en-US">
+              <a:cs typeface="Calibri"/>
+            </a:endParaRPr>
+          </a:p>
+          <a:p>
+            <a:endParaRPr lang="en-US" dirty="0">
+              <a:cs typeface="Calibri" panose="020F0502020204030204"/>
+            </a:endParaRPr>
+          </a:p>
+          <a:p>
+            <a:r>
+              <a:rPr lang="en-US" dirty="0" err="1">
+                <a:cs typeface="Calibri"/>
+              </a:rPr>
+              <a:t>Haciendo</a:t>
+            </a:r>
+            <a:r>
+              <a:rPr lang="en-US" dirty="0">
+                <a:cs typeface="Calibri"/>
+              </a:rPr>
+              <a:t> un </a:t>
+            </a:r>
+            <a:r>
+              <a:rPr lang="en-US" dirty="0" err="1">
+                <a:cs typeface="Calibri"/>
+              </a:rPr>
+              <a:t>análisis</a:t>
+            </a:r>
+            <a:r>
+              <a:rPr lang="en-US" dirty="0">
+                <a:cs typeface="Calibri"/>
+              </a:rPr>
+              <a:t> </a:t>
+            </a:r>
+            <a:r>
+              <a:rPr lang="en-US" dirty="0" err="1">
+                <a:cs typeface="Calibri"/>
+              </a:rPr>
+              <a:t>sobre</a:t>
+            </a:r>
+            <a:r>
+              <a:rPr lang="en-US" dirty="0">
+                <a:cs typeface="Calibri"/>
+              </a:rPr>
+              <a:t> la </a:t>
+            </a:r>
+            <a:r>
+              <a:rPr lang="en-US" dirty="0" err="1">
+                <a:cs typeface="Calibri"/>
+              </a:rPr>
+              <a:t>composición</a:t>
+            </a:r>
+            <a:r>
+              <a:rPr lang="en-US" dirty="0">
+                <a:cs typeface="Calibri"/>
+              </a:rPr>
+              <a:t> de los </a:t>
+            </a:r>
+            <a:r>
+              <a:rPr lang="en-US" dirty="0" err="1">
+                <a:cs typeface="Calibri"/>
+              </a:rPr>
+              <a:t>datos</a:t>
+            </a:r>
+            <a:r>
+              <a:rPr lang="en-US" dirty="0">
+                <a:cs typeface="Calibri"/>
+              </a:rPr>
+              <a:t> que </a:t>
+            </a:r>
+            <a:r>
+              <a:rPr lang="en-US" dirty="0" err="1">
+                <a:cs typeface="Calibri"/>
+              </a:rPr>
+              <a:t>tenemos</a:t>
+            </a:r>
+            <a:r>
+              <a:rPr lang="en-US" dirty="0">
+                <a:cs typeface="Calibri"/>
+              </a:rPr>
+              <a:t>, </a:t>
+            </a:r>
+            <a:r>
+              <a:rPr lang="en-US" dirty="0" err="1">
+                <a:cs typeface="Calibri"/>
+              </a:rPr>
+              <a:t>cómo</a:t>
+            </a:r>
+            <a:r>
+              <a:rPr lang="en-US" dirty="0">
+                <a:cs typeface="Calibri"/>
+              </a:rPr>
+              <a:t> se </a:t>
+            </a:r>
+            <a:r>
+              <a:rPr lang="en-US" dirty="0" err="1">
+                <a:cs typeface="Calibri"/>
+              </a:rPr>
+              <a:t>relacionan</a:t>
+            </a:r>
+            <a:r>
+              <a:rPr lang="en-US" dirty="0">
+                <a:cs typeface="Calibri"/>
+              </a:rPr>
+              <a:t> entre </a:t>
+            </a:r>
+            <a:r>
+              <a:rPr lang="en-US" dirty="0" err="1">
+                <a:cs typeface="Calibri"/>
+              </a:rPr>
+              <a:t>sí</a:t>
+            </a:r>
+            <a:r>
+              <a:rPr lang="en-US" dirty="0">
+                <a:cs typeface="Calibri"/>
+              </a:rPr>
+              <a:t> y </a:t>
+            </a:r>
+            <a:r>
+              <a:rPr lang="en-US" dirty="0" err="1">
+                <a:cs typeface="Calibri"/>
+              </a:rPr>
+              <a:t>cómo</a:t>
+            </a:r>
+            <a:r>
+              <a:rPr lang="en-US" dirty="0">
+                <a:cs typeface="Calibri"/>
+              </a:rPr>
+              <a:t> </a:t>
+            </a:r>
+            <a:r>
+              <a:rPr lang="en-US" dirty="0" err="1">
+                <a:cs typeface="Calibri"/>
+              </a:rPr>
+              <a:t>podemos</a:t>
+            </a:r>
+            <a:r>
+              <a:rPr lang="en-US" dirty="0">
+                <a:cs typeface="Calibri"/>
+              </a:rPr>
+              <a:t> </a:t>
+            </a:r>
+            <a:r>
+              <a:rPr lang="en-US" dirty="0" err="1">
+                <a:cs typeface="Calibri"/>
+              </a:rPr>
+              <a:t>obtener</a:t>
+            </a:r>
+            <a:r>
+              <a:rPr lang="en-US" dirty="0">
+                <a:cs typeface="Calibri"/>
+              </a:rPr>
+              <a:t> </a:t>
+            </a:r>
+            <a:r>
+              <a:rPr lang="en-US" dirty="0" err="1">
+                <a:cs typeface="Calibri"/>
+              </a:rPr>
+              <a:t>algunos</a:t>
+            </a:r>
+            <a:r>
+              <a:rPr lang="en-US" dirty="0">
+                <a:cs typeface="Calibri"/>
+              </a:rPr>
+              <a:t> a </a:t>
+            </a:r>
+            <a:r>
+              <a:rPr lang="en-US" dirty="0" err="1">
+                <a:cs typeface="Calibri"/>
+              </a:rPr>
+              <a:t>partir</a:t>
+            </a:r>
+            <a:r>
+              <a:rPr lang="en-US" dirty="0">
+                <a:cs typeface="Calibri"/>
+              </a:rPr>
+              <a:t> de </a:t>
+            </a:r>
+            <a:r>
+              <a:rPr lang="en-US" dirty="0" err="1">
+                <a:cs typeface="Calibri"/>
+              </a:rPr>
+              <a:t>otros</a:t>
+            </a:r>
+            <a:r>
+              <a:rPr lang="en-US" dirty="0">
+                <a:cs typeface="Calibri"/>
+              </a:rPr>
+              <a:t>.</a:t>
+            </a:r>
+          </a:p>
+          <a:p>
+            <a:r>
+              <a:rPr lang="en-US" dirty="0">
+                <a:cs typeface="Calibri"/>
+              </a:rPr>
+              <a:t>Para </a:t>
+            </a:r>
+            <a:r>
+              <a:rPr lang="en-US" dirty="0" err="1">
+                <a:cs typeface="Calibri"/>
+              </a:rPr>
+              <a:t>facilitar</a:t>
+            </a:r>
+            <a:r>
+              <a:rPr lang="en-US" dirty="0">
+                <a:cs typeface="Calibri"/>
+              </a:rPr>
+              <a:t> </a:t>
+            </a:r>
+            <a:r>
+              <a:rPr lang="en-US" dirty="0" err="1">
+                <a:cs typeface="Calibri"/>
+              </a:rPr>
+              <a:t>este</a:t>
+            </a:r>
+            <a:r>
+              <a:rPr lang="en-US" dirty="0">
+                <a:cs typeface="Calibri"/>
+              </a:rPr>
+              <a:t> </a:t>
+            </a:r>
+            <a:r>
+              <a:rPr lang="en-US" dirty="0" err="1">
+                <a:cs typeface="Calibri"/>
+              </a:rPr>
+              <a:t>trabajo</a:t>
+            </a:r>
+            <a:r>
+              <a:rPr lang="en-US" dirty="0">
+                <a:cs typeface="Calibri"/>
+              </a:rPr>
+              <a:t> </a:t>
+            </a:r>
+            <a:r>
+              <a:rPr lang="en-US" dirty="0" err="1">
+                <a:cs typeface="Calibri"/>
+              </a:rPr>
+              <a:t>utilizamos</a:t>
+            </a:r>
+            <a:r>
+              <a:rPr lang="en-US" dirty="0">
+                <a:cs typeface="Calibri"/>
+              </a:rPr>
+              <a:t> </a:t>
+            </a:r>
+            <a:r>
+              <a:rPr lang="en-US" dirty="0" err="1">
+                <a:cs typeface="Calibri"/>
+              </a:rPr>
+              <a:t>herramientas</a:t>
+            </a:r>
+            <a:r>
+              <a:rPr lang="en-US" dirty="0">
+                <a:cs typeface="Calibri"/>
+              </a:rPr>
+              <a:t> </a:t>
+            </a:r>
+            <a:r>
+              <a:rPr lang="en-US" dirty="0" err="1">
+                <a:cs typeface="Calibri"/>
+              </a:rPr>
+              <a:t>tecnológicas</a:t>
+            </a:r>
+            <a:r>
+              <a:rPr lang="en-US" dirty="0">
+                <a:cs typeface="Calibri"/>
+              </a:rPr>
+              <a:t> </a:t>
+            </a:r>
+            <a:r>
+              <a:rPr lang="en-US" dirty="0" err="1">
+                <a:cs typeface="Calibri"/>
+              </a:rPr>
+              <a:t>como</a:t>
+            </a:r>
+            <a:r>
+              <a:rPr lang="en-US" dirty="0">
+                <a:cs typeface="Calibri"/>
+              </a:rPr>
+              <a:t> Python y </a:t>
+            </a:r>
+            <a:r>
+              <a:rPr lang="en-US" dirty="0" err="1">
+                <a:cs typeface="Calibri"/>
+              </a:rPr>
+              <a:t>varias</a:t>
+            </a:r>
+            <a:r>
+              <a:rPr lang="en-US" dirty="0">
+                <a:cs typeface="Calibri"/>
+              </a:rPr>
+              <a:t> </a:t>
+            </a:r>
+            <a:r>
+              <a:rPr lang="en-US" dirty="0" err="1">
+                <a:cs typeface="Calibri"/>
+              </a:rPr>
+              <a:t>bibliotecas</a:t>
+            </a:r>
+            <a:r>
+              <a:rPr lang="en-US" dirty="0">
+                <a:cs typeface="Calibri"/>
+              </a:rPr>
+              <a:t> </a:t>
+            </a:r>
+            <a:r>
+              <a:rPr lang="en-US" dirty="0" err="1">
+                <a:cs typeface="Calibri"/>
+              </a:rPr>
+              <a:t>creadas</a:t>
+            </a:r>
+            <a:r>
+              <a:rPr lang="en-US" dirty="0">
+                <a:cs typeface="Calibri"/>
+              </a:rPr>
+              <a:t> para </a:t>
+            </a:r>
+            <a:r>
+              <a:rPr lang="en-US" dirty="0" err="1">
+                <a:cs typeface="Calibri"/>
+              </a:rPr>
+              <a:t>este</a:t>
+            </a:r>
+            <a:r>
+              <a:rPr lang="en-US" dirty="0">
+                <a:cs typeface="Calibri"/>
+              </a:rPr>
+              <a:t> </a:t>
+            </a:r>
+            <a:r>
+              <a:rPr lang="en-US" dirty="0" err="1">
+                <a:cs typeface="Calibri"/>
+              </a:rPr>
+              <a:t>lenguaje</a:t>
+            </a:r>
+            <a:r>
+              <a:rPr lang="en-US" dirty="0">
+                <a:cs typeface="Calibri"/>
+              </a:rPr>
+              <a:t>.</a:t>
+            </a:r>
           </a:p>
         </p:txBody>
       </p:sp>
     </p:spTree>
     <p:extLst>
       <p:ext uri="{BB962C8B-B14F-4D97-AF65-F5344CB8AC3E}">
-        <p14:creationId xmlns:p14="http://schemas.microsoft.com/office/powerpoint/2010/main" val="1840946815"/>
+        <p14:creationId xmlns:p14="http://schemas.microsoft.com/office/powerpoint/2010/main" val="2179118349"/>
       </p:ext>
     </p:extLst>
   </p:cSld>
   <p:clrMapOvr>
     <a:masterClrMapping/>
   </p:clrMapOvr>
-  <p:timing>
-    <p:tnLst>
-      <p:par>
-        <p:cTn id="1" dur="indefinite" restart="never" nodeType="tmRoot"/>
-      </p:par>
-    </p:tnLst>
-  </p:timing>
 </p:sld>
 </file>
 
@@ -2660,17 +5731,527 @@
         </p:nvSpPr>
         <p:spPr/>
         <p:txBody>
-          <a:bodyPr/>
+          <a:bodyPr anchor="t"/>
           <a:lstStyle/>
           <a:p>
-            <a:endParaRPr lang="en-US"/>
+            <a:r>
+              <a:rPr lang="en-US" dirty="0" err="1">
+                <a:cs typeface="Calibri"/>
+              </a:rPr>
+              <a:t>Simplificación</a:t>
+            </a:r>
+            <a:r>
+              <a:rPr lang="en-US" dirty="0">
+                <a:cs typeface="Calibri"/>
+              </a:rPr>
+              <a:t> de los </a:t>
+            </a:r>
+            <a:r>
+              <a:rPr lang="en-US" dirty="0" err="1">
+                <a:cs typeface="Calibri"/>
+              </a:rPr>
+              <a:t>datos</a:t>
+            </a:r>
+          </a:p>
+          <a:p>
+            <a:endParaRPr lang="en-US" dirty="0">
+              <a:cs typeface="Calibri"/>
+            </a:endParaRPr>
+          </a:p>
+          <a:p>
+            <a:r>
+              <a:rPr lang="en-US" dirty="0">
+                <a:cs typeface="Calibri"/>
+              </a:rPr>
+              <a:t>Al </a:t>
+            </a:r>
+            <a:r>
+              <a:rPr lang="en-US" dirty="0" err="1">
+                <a:cs typeface="Calibri"/>
+              </a:rPr>
+              <a:t>hacer</a:t>
+            </a:r>
+            <a:r>
+              <a:rPr lang="en-US" dirty="0">
+                <a:cs typeface="Calibri"/>
+              </a:rPr>
+              <a:t> un </a:t>
+            </a:r>
+            <a:r>
+              <a:rPr lang="en-US" dirty="0" err="1">
+                <a:cs typeface="Calibri"/>
+              </a:rPr>
+              <a:t>análisis</a:t>
+            </a:r>
+            <a:r>
+              <a:rPr lang="en-US" dirty="0">
+                <a:cs typeface="Calibri"/>
+              </a:rPr>
+              <a:t> del </a:t>
+            </a:r>
+            <a:r>
+              <a:rPr lang="en-US" dirty="0" err="1">
+                <a:cs typeface="Calibri"/>
+              </a:rPr>
+              <a:t>objetivo</a:t>
+            </a:r>
+            <a:r>
+              <a:rPr lang="en-US" dirty="0">
+                <a:cs typeface="Calibri"/>
+              </a:rPr>
+              <a:t> del </a:t>
+            </a:r>
+            <a:r>
+              <a:rPr lang="en-US" dirty="0" err="1">
+                <a:cs typeface="Calibri"/>
+              </a:rPr>
+              <a:t>proyecto</a:t>
+            </a:r>
+            <a:r>
+              <a:rPr lang="en-US" dirty="0">
+                <a:cs typeface="Calibri"/>
+              </a:rPr>
+              <a:t>, </a:t>
+            </a:r>
+            <a:r>
+              <a:rPr lang="en-US" dirty="0" err="1">
+                <a:cs typeface="Calibri"/>
+              </a:rPr>
+              <a:t>decidimos</a:t>
+            </a:r>
+            <a:r>
+              <a:rPr lang="en-US" dirty="0">
+                <a:cs typeface="Calibri"/>
+              </a:rPr>
+              <a:t> que las </a:t>
+            </a:r>
+            <a:r>
+              <a:rPr lang="en-US" dirty="0" err="1">
+                <a:cs typeface="Calibri"/>
+              </a:rPr>
+              <a:t>columnas</a:t>
+            </a:r>
+            <a:r>
+              <a:rPr lang="en-US" dirty="0">
+                <a:cs typeface="Calibri"/>
+              </a:rPr>
+              <a:t> </a:t>
+            </a:r>
+            <a:r>
+              <a:rPr lang="en-US" dirty="0" err="1">
+                <a:cs typeface="Calibri"/>
+              </a:rPr>
+              <a:t>correspondientes</a:t>
+            </a:r>
+            <a:r>
+              <a:rPr lang="en-US" dirty="0">
+                <a:cs typeface="Calibri"/>
+              </a:rPr>
+              <a:t> a la </a:t>
+            </a:r>
+            <a:r>
+              <a:rPr lang="en-US" dirty="0" err="1">
+                <a:cs typeface="Calibri"/>
+              </a:rPr>
+              <a:t>foto</a:t>
+            </a:r>
+            <a:r>
+              <a:rPr lang="en-US" dirty="0">
+                <a:cs typeface="Calibri"/>
+              </a:rPr>
+              <a:t> de la </a:t>
+            </a:r>
+            <a:r>
+              <a:rPr lang="en-US" dirty="0" err="1">
+                <a:cs typeface="Calibri"/>
+              </a:rPr>
+              <a:t>propiedad</a:t>
+            </a:r>
+            <a:r>
+              <a:rPr lang="en-US" dirty="0">
+                <a:cs typeface="Calibri"/>
+              </a:rPr>
+              <a:t> (</a:t>
+            </a:r>
+            <a:r>
+              <a:rPr lang="en-US" dirty="0" err="1">
+                <a:cs typeface="Calibri"/>
+              </a:rPr>
+              <a:t>image_thumbnail</a:t>
+            </a:r>
+            <a:r>
+              <a:rPr lang="en-US" dirty="0">
+                <a:cs typeface="Calibri"/>
+              </a:rPr>
+              <a:t>) y de la </a:t>
+            </a:r>
+            <a:r>
+              <a:rPr lang="en-US" dirty="0" err="1">
+                <a:cs typeface="Calibri"/>
+              </a:rPr>
+              <a:t>dirección</a:t>
+            </a:r>
+            <a:r>
+              <a:rPr lang="en-US" dirty="0">
+                <a:cs typeface="Calibri"/>
+              </a:rPr>
+              <a:t> web de la </a:t>
+            </a:r>
+            <a:r>
+              <a:rPr lang="en-US" dirty="0" err="1">
+                <a:cs typeface="Calibri"/>
+              </a:rPr>
+              <a:t>propiedad</a:t>
+            </a:r>
+            <a:r>
+              <a:rPr lang="en-US" dirty="0">
+                <a:cs typeface="Calibri"/>
+              </a:rPr>
+              <a:t> en el sitio de </a:t>
+            </a:r>
+            <a:r>
+              <a:rPr lang="en-US" dirty="0" err="1">
+                <a:cs typeface="Calibri"/>
+              </a:rPr>
+              <a:t>properatti</a:t>
+            </a:r>
+            <a:r>
+              <a:rPr lang="en-US" dirty="0">
+                <a:cs typeface="Calibri"/>
+              </a:rPr>
+              <a:t> (</a:t>
+            </a:r>
+            <a:r>
+              <a:rPr lang="en-US" dirty="0" err="1">
+                <a:ea typeface="+mn-lt"/>
+                <a:cs typeface="+mn-lt"/>
+              </a:rPr>
+              <a:t>properati_url</a:t>
+            </a:r>
+            <a:r>
+              <a:rPr lang="en-US" dirty="0">
+                <a:ea typeface="+mn-lt"/>
+                <a:cs typeface="+mn-lt"/>
+              </a:rPr>
+              <a:t>) no </a:t>
+            </a:r>
+            <a:r>
+              <a:rPr lang="en-US" dirty="0" err="1">
+                <a:ea typeface="+mn-lt"/>
+                <a:cs typeface="+mn-lt"/>
+              </a:rPr>
+              <a:t>eran</a:t>
+            </a:r>
+            <a:r>
+              <a:rPr lang="en-US" dirty="0">
+                <a:ea typeface="+mn-lt"/>
+                <a:cs typeface="+mn-lt"/>
+              </a:rPr>
+              <a:t> </a:t>
+            </a:r>
+            <a:r>
+              <a:rPr lang="en-US" dirty="0" err="1">
+                <a:ea typeface="+mn-lt"/>
+                <a:cs typeface="+mn-lt"/>
+              </a:rPr>
+              <a:t>necesarias</a:t>
+            </a:r>
+            <a:r>
+              <a:rPr lang="en-US" dirty="0">
+                <a:ea typeface="+mn-lt"/>
+                <a:cs typeface="+mn-lt"/>
+              </a:rPr>
+              <a:t>. </a:t>
+            </a:r>
+            <a:r>
+              <a:rPr lang="en-US" dirty="0" err="1">
+                <a:ea typeface="+mn-lt"/>
+                <a:cs typeface="+mn-lt"/>
+              </a:rPr>
+              <a:t>Debido</a:t>
+            </a:r>
+            <a:r>
+              <a:rPr lang="en-US" dirty="0">
+                <a:ea typeface="+mn-lt"/>
+                <a:cs typeface="+mn-lt"/>
+              </a:rPr>
+              <a:t> a </a:t>
+            </a:r>
+            <a:r>
+              <a:rPr lang="en-US" dirty="0" err="1">
+                <a:ea typeface="+mn-lt"/>
+                <a:cs typeface="+mn-lt"/>
+              </a:rPr>
+              <a:t>esto</a:t>
+            </a:r>
+            <a:r>
+              <a:rPr lang="en-US" dirty="0">
+                <a:ea typeface="+mn-lt"/>
+                <a:cs typeface="+mn-lt"/>
+              </a:rPr>
+              <a:t> las </a:t>
+            </a:r>
+            <a:r>
+              <a:rPr lang="en-US" dirty="0" err="1">
+                <a:ea typeface="+mn-lt"/>
+                <a:cs typeface="+mn-lt"/>
+              </a:rPr>
+              <a:t>eliminamos</a:t>
+            </a:r>
+            <a:r>
+              <a:rPr lang="en-US" dirty="0">
+                <a:ea typeface="+mn-lt"/>
+                <a:cs typeface="+mn-lt"/>
+              </a:rPr>
+              <a:t> del data frame para </a:t>
+            </a:r>
+            <a:r>
+              <a:rPr lang="en-US" dirty="0" err="1">
+                <a:ea typeface="+mn-lt"/>
+                <a:cs typeface="+mn-lt"/>
+              </a:rPr>
+              <a:t>alivianar</a:t>
+            </a:r>
+            <a:r>
+              <a:rPr lang="en-US" dirty="0">
+                <a:ea typeface="+mn-lt"/>
+                <a:cs typeface="+mn-lt"/>
+              </a:rPr>
+              <a:t> el </a:t>
+            </a:r>
+            <a:r>
+              <a:rPr lang="en-US" dirty="0" err="1">
+                <a:ea typeface="+mn-lt"/>
+                <a:cs typeface="+mn-lt"/>
+              </a:rPr>
+              <a:t>procesamiento</a:t>
+            </a:r>
+            <a:r>
+              <a:rPr lang="en-US" dirty="0">
+                <a:ea typeface="+mn-lt"/>
+                <a:cs typeface="+mn-lt"/>
+              </a:rPr>
+              <a:t>.</a:t>
+            </a:r>
+          </a:p>
+          <a:p>
+            <a:r>
+              <a:rPr lang="en-US" dirty="0" err="1">
+                <a:ea typeface="+mn-lt"/>
+                <a:cs typeface="+mn-lt"/>
+              </a:rPr>
+              <a:t>Eliminamos</a:t>
+            </a:r>
+            <a:r>
+              <a:rPr lang="en-US" dirty="0">
+                <a:ea typeface="+mn-lt"/>
+                <a:cs typeface="+mn-lt"/>
+              </a:rPr>
+              <a:t> </a:t>
+            </a:r>
+            <a:r>
+              <a:rPr lang="en-US" dirty="0" err="1">
+                <a:ea typeface="+mn-lt"/>
+                <a:cs typeface="+mn-lt"/>
+              </a:rPr>
+              <a:t>también</a:t>
+            </a:r>
+            <a:r>
+              <a:rPr lang="en-US" dirty="0">
+                <a:ea typeface="+mn-lt"/>
+                <a:cs typeface="+mn-lt"/>
+              </a:rPr>
+              <a:t> el </a:t>
+            </a:r>
+            <a:r>
+              <a:rPr lang="en-US" dirty="0" err="1">
+                <a:ea typeface="+mn-lt"/>
+                <a:cs typeface="+mn-lt"/>
+              </a:rPr>
+              <a:t>dato</a:t>
+            </a:r>
+            <a:r>
+              <a:rPr lang="en-US" dirty="0">
+                <a:ea typeface="+mn-lt"/>
+                <a:cs typeface="+mn-lt"/>
+              </a:rPr>
+              <a:t> </a:t>
+            </a:r>
+            <a:r>
+              <a:rPr lang="en-US" dirty="0" err="1">
+                <a:ea typeface="+mn-lt"/>
+                <a:cs typeface="+mn-lt"/>
+              </a:rPr>
+              <a:t>piso</a:t>
+            </a:r>
+            <a:r>
+              <a:rPr lang="en-US" dirty="0">
+                <a:ea typeface="+mn-lt"/>
+                <a:cs typeface="+mn-lt"/>
+              </a:rPr>
+              <a:t> (floor) </a:t>
+            </a:r>
+            <a:r>
+              <a:rPr lang="en-US" dirty="0" err="1">
+                <a:ea typeface="+mn-lt"/>
+                <a:cs typeface="+mn-lt"/>
+              </a:rPr>
+              <a:t>ya</a:t>
+            </a:r>
+            <a:r>
+              <a:rPr lang="en-US" dirty="0">
+                <a:ea typeface="+mn-lt"/>
+                <a:cs typeface="+mn-lt"/>
+              </a:rPr>
+              <a:t> que </a:t>
+            </a:r>
+            <a:r>
+              <a:rPr lang="en-US" dirty="0" err="1">
+                <a:ea typeface="+mn-lt"/>
+                <a:cs typeface="+mn-lt"/>
+              </a:rPr>
+              <a:t>tampoco</a:t>
+            </a:r>
+            <a:r>
+              <a:rPr lang="en-US" dirty="0">
+                <a:ea typeface="+mn-lt"/>
+                <a:cs typeface="+mn-lt"/>
+              </a:rPr>
+              <a:t> </a:t>
+            </a:r>
+            <a:r>
+              <a:rPr lang="en-US" dirty="0" err="1">
+                <a:ea typeface="+mn-lt"/>
+                <a:cs typeface="+mn-lt"/>
+              </a:rPr>
+              <a:t>vimos</a:t>
+            </a:r>
+            <a:r>
+              <a:rPr lang="en-US" dirty="0">
+                <a:ea typeface="+mn-lt"/>
+                <a:cs typeface="+mn-lt"/>
+              </a:rPr>
+              <a:t> </a:t>
+            </a:r>
+            <a:r>
+              <a:rPr lang="en-US" dirty="0" err="1">
+                <a:ea typeface="+mn-lt"/>
+                <a:cs typeface="+mn-lt"/>
+              </a:rPr>
+              <a:t>utilidad</a:t>
+            </a:r>
+            <a:r>
+              <a:rPr lang="en-US" dirty="0">
+                <a:ea typeface="+mn-lt"/>
+                <a:cs typeface="+mn-lt"/>
+              </a:rPr>
+              <a:t> a la hora de </a:t>
+            </a:r>
+            <a:r>
+              <a:rPr lang="en-US" dirty="0" err="1">
+                <a:ea typeface="+mn-lt"/>
+                <a:cs typeface="+mn-lt"/>
+              </a:rPr>
+              <a:t>realizar</a:t>
+            </a:r>
+            <a:r>
+              <a:rPr lang="en-US" dirty="0">
+                <a:ea typeface="+mn-lt"/>
+                <a:cs typeface="+mn-lt"/>
+              </a:rPr>
+              <a:t> una </a:t>
+            </a:r>
+            <a:r>
+              <a:rPr lang="en-US" dirty="0" err="1">
+                <a:ea typeface="+mn-lt"/>
+                <a:cs typeface="+mn-lt"/>
+              </a:rPr>
+              <a:t>cotización</a:t>
+            </a:r>
+            <a:r>
+              <a:rPr lang="en-US" dirty="0">
+                <a:ea typeface="+mn-lt"/>
+                <a:cs typeface="+mn-lt"/>
+              </a:rPr>
+              <a:t> de </a:t>
+            </a:r>
+            <a:r>
+              <a:rPr lang="en-US" dirty="0" err="1">
+                <a:ea typeface="+mn-lt"/>
+                <a:cs typeface="+mn-lt"/>
+              </a:rPr>
+              <a:t>propiedades</a:t>
+            </a:r>
+            <a:r>
+              <a:rPr lang="en-US" dirty="0">
+                <a:ea typeface="+mn-lt"/>
+                <a:cs typeface="+mn-lt"/>
+              </a:rPr>
+              <a:t> y </a:t>
+            </a:r>
+            <a:r>
+              <a:rPr lang="en-US" dirty="0" err="1">
+                <a:ea typeface="+mn-lt"/>
+                <a:cs typeface="+mn-lt"/>
+              </a:rPr>
+              <a:t>su</a:t>
+            </a:r>
+            <a:r>
+              <a:rPr lang="en-US" dirty="0">
+                <a:ea typeface="+mn-lt"/>
+                <a:cs typeface="+mn-lt"/>
+              </a:rPr>
+              <a:t> </a:t>
+            </a:r>
+            <a:r>
+              <a:rPr lang="en-US" dirty="0" err="1">
+                <a:ea typeface="+mn-lt"/>
+                <a:cs typeface="+mn-lt"/>
+              </a:rPr>
+              <a:t>nivel</a:t>
+            </a:r>
+            <a:r>
+              <a:rPr lang="en-US" dirty="0">
+                <a:ea typeface="+mn-lt"/>
+                <a:cs typeface="+mn-lt"/>
+              </a:rPr>
+              <a:t> de </a:t>
+            </a:r>
+            <a:r>
+              <a:rPr lang="en-US" dirty="0" err="1">
+                <a:ea typeface="+mn-lt"/>
+                <a:cs typeface="+mn-lt"/>
+              </a:rPr>
+              <a:t>completitud</a:t>
+            </a:r>
+            <a:r>
+              <a:rPr lang="en-US" dirty="0">
+                <a:ea typeface="+mn-lt"/>
+                <a:cs typeface="+mn-lt"/>
+              </a:rPr>
+              <a:t> era </a:t>
+            </a:r>
+            <a:r>
+              <a:rPr lang="en-US" dirty="0" err="1">
+                <a:ea typeface="+mn-lt"/>
+                <a:cs typeface="+mn-lt"/>
+              </a:rPr>
+              <a:t>muy</a:t>
+            </a:r>
+            <a:r>
+              <a:rPr lang="en-US" dirty="0">
+                <a:ea typeface="+mn-lt"/>
+                <a:cs typeface="+mn-lt"/>
+              </a:rPr>
+              <a:t> bajo.</a:t>
+            </a:r>
           </a:p>
         </p:txBody>
       </p:sp>
     </p:spTree>
     <p:extLst>
       <p:ext uri="{BB962C8B-B14F-4D97-AF65-F5344CB8AC3E}">
-        <p14:creationId xmlns:p14="http://schemas.microsoft.com/office/powerpoint/2010/main" val="2244995768"/>
+        <p14:creationId xmlns:p14="http://schemas.microsoft.com/office/powerpoint/2010/main" val="3583675036"/>
       </p:ext>
     </p:extLst>
   </p:cSld>
@@ -2728,17 +6309,567 @@
         </p:nvSpPr>
         <p:spPr/>
         <p:txBody>
-          <a:bodyPr/>
+          <a:bodyPr anchor="t"/>
           <a:lstStyle/>
           <a:p>
-            <a:endParaRPr lang="en-US"/>
+            <a:r>
+              <a:rPr lang="en-US" dirty="0">
+                <a:cs typeface="Calibri"/>
+              </a:rPr>
+              <a:t>¿</a:t>
+            </a:r>
+            <a:r>
+              <a:rPr lang="en-US" dirty="0" err="1">
+                <a:cs typeface="Calibri"/>
+              </a:rPr>
+              <a:t>Cómo</a:t>
+            </a:r>
+            <a:r>
+              <a:rPr lang="en-US" dirty="0">
+                <a:cs typeface="Calibri"/>
+              </a:rPr>
+              <a:t> </a:t>
+            </a:r>
+            <a:r>
+              <a:rPr lang="en-US" dirty="0" err="1">
+                <a:cs typeface="Calibri"/>
+              </a:rPr>
+              <a:t>completar</a:t>
+            </a:r>
+            <a:r>
+              <a:rPr lang="en-US" dirty="0">
+                <a:cs typeface="Calibri"/>
+              </a:rPr>
+              <a:t> los </a:t>
+            </a:r>
+            <a:r>
+              <a:rPr lang="en-US" dirty="0" err="1">
+                <a:cs typeface="Calibri"/>
+              </a:rPr>
+              <a:t>valores</a:t>
+            </a:r>
+            <a:r>
+              <a:rPr lang="en-US" dirty="0">
+                <a:cs typeface="Calibri"/>
+              </a:rPr>
+              <a:t> </a:t>
+            </a:r>
+            <a:r>
+              <a:rPr lang="en-US" dirty="0" err="1">
+                <a:cs typeface="Calibri"/>
+              </a:rPr>
+              <a:t>faltantes</a:t>
+            </a:r>
+            <a:r>
+              <a:rPr lang="en-US" dirty="0">
+                <a:cs typeface="Calibri"/>
+              </a:rPr>
+              <a:t>?</a:t>
+            </a:r>
+          </a:p>
+          <a:p>
+            <a:endParaRPr lang="en-US" dirty="0">
+              <a:cs typeface="Calibri"/>
+            </a:endParaRPr>
+          </a:p>
+          <a:p>
+            <a:r>
+              <a:rPr lang="en-US" dirty="0">
+                <a:cs typeface="Calibri"/>
+              </a:rPr>
+              <a:t>La </a:t>
+            </a:r>
+            <a:r>
+              <a:rPr lang="en-US" dirty="0" err="1">
+                <a:cs typeface="Calibri"/>
+              </a:rPr>
+              <a:t>estrategia</a:t>
+            </a:r>
+            <a:r>
+              <a:rPr lang="en-US" dirty="0">
+                <a:cs typeface="Calibri"/>
+              </a:rPr>
+              <a:t> que </a:t>
+            </a:r>
+            <a:r>
+              <a:rPr lang="en-US" dirty="0" err="1">
+                <a:cs typeface="Calibri"/>
+              </a:rPr>
+              <a:t>seguimos</a:t>
+            </a:r>
+            <a:r>
+              <a:rPr lang="en-US" dirty="0">
+                <a:cs typeface="Calibri"/>
+              </a:rPr>
+              <a:t> </a:t>
+            </a:r>
+            <a:r>
+              <a:rPr lang="en-US" dirty="0" err="1">
+                <a:cs typeface="Calibri"/>
+              </a:rPr>
+              <a:t>fue</a:t>
+            </a:r>
+            <a:r>
+              <a:rPr lang="en-US" dirty="0">
+                <a:cs typeface="Calibri"/>
+              </a:rPr>
+              <a:t> </a:t>
+            </a:r>
+            <a:r>
+              <a:rPr lang="en-US" dirty="0" err="1">
+                <a:cs typeface="Calibri"/>
+              </a:rPr>
+              <a:t>principalmente</a:t>
+            </a:r>
+            <a:r>
+              <a:rPr lang="en-US" dirty="0">
+                <a:cs typeface="Calibri"/>
+              </a:rPr>
+              <a:t> </a:t>
+            </a:r>
+            <a:r>
+              <a:rPr lang="en-US" dirty="0" err="1">
+                <a:cs typeface="Calibri"/>
+              </a:rPr>
+              <a:t>completar</a:t>
+            </a:r>
+            <a:r>
+              <a:rPr lang="en-US" dirty="0">
+                <a:cs typeface="Calibri"/>
+              </a:rPr>
+              <a:t> </a:t>
+            </a:r>
+            <a:r>
+              <a:rPr lang="en-US" dirty="0" err="1">
+                <a:cs typeface="Calibri"/>
+              </a:rPr>
+              <a:t>datos</a:t>
+            </a:r>
+            <a:r>
+              <a:rPr lang="en-US" dirty="0">
+                <a:cs typeface="Calibri"/>
+              </a:rPr>
+              <a:t> a </a:t>
+            </a:r>
+            <a:r>
+              <a:rPr lang="en-US" dirty="0" err="1">
+                <a:cs typeface="Calibri"/>
+              </a:rPr>
+              <a:t>partir</a:t>
+            </a:r>
+            <a:r>
+              <a:rPr lang="en-US" dirty="0">
+                <a:cs typeface="Calibri"/>
+              </a:rPr>
+              <a:t> de </a:t>
+            </a:r>
+            <a:r>
+              <a:rPr lang="en-US" dirty="0" err="1">
+                <a:cs typeface="Calibri"/>
+              </a:rPr>
+              <a:t>otros</a:t>
+            </a:r>
+            <a:r>
+              <a:rPr lang="en-US" dirty="0">
+                <a:cs typeface="Calibri"/>
+              </a:rPr>
+              <a:t> </a:t>
+            </a:r>
+            <a:r>
+              <a:rPr lang="en-US" dirty="0" err="1">
+                <a:cs typeface="Calibri"/>
+              </a:rPr>
+              <a:t>presentes</a:t>
+            </a:r>
+            <a:r>
+              <a:rPr lang="en-US" dirty="0">
+                <a:cs typeface="Calibri"/>
+              </a:rPr>
+              <a:t> en el set de </a:t>
+            </a:r>
+            <a:r>
+              <a:rPr lang="en-US" dirty="0" err="1">
+                <a:cs typeface="Calibri"/>
+              </a:rPr>
+              <a:t>datos</a:t>
+            </a:r>
+            <a:r>
+              <a:rPr lang="en-US" dirty="0">
+                <a:cs typeface="Calibri"/>
+              </a:rPr>
+              <a:t>.</a:t>
+            </a:r>
+          </a:p>
+          <a:p>
+            <a:r>
+              <a:rPr lang="en-US" dirty="0" err="1">
+                <a:cs typeface="Calibri"/>
+              </a:rPr>
+              <a:t>Pudimos</a:t>
+            </a:r>
+            <a:r>
+              <a:rPr lang="en-US" dirty="0">
+                <a:cs typeface="Calibri"/>
+              </a:rPr>
+              <a:t> </a:t>
+            </a:r>
+            <a:r>
+              <a:rPr lang="en-US" dirty="0" err="1">
+                <a:cs typeface="Calibri"/>
+              </a:rPr>
+              <a:t>establecer</a:t>
+            </a:r>
+            <a:r>
+              <a:rPr lang="en-US" dirty="0">
+                <a:cs typeface="Calibri"/>
+              </a:rPr>
+              <a:t>, </a:t>
+            </a:r>
+            <a:r>
+              <a:rPr lang="en-US" dirty="0" err="1">
+                <a:cs typeface="Calibri"/>
+              </a:rPr>
+              <a:t>teniendo</a:t>
+            </a:r>
+            <a:r>
+              <a:rPr lang="en-US" dirty="0">
+                <a:cs typeface="Calibri"/>
+              </a:rPr>
+              <a:t> en </a:t>
+            </a:r>
+            <a:r>
+              <a:rPr lang="en-US" dirty="0" err="1">
+                <a:cs typeface="Calibri"/>
+              </a:rPr>
+              <a:t>cuenta</a:t>
+            </a:r>
+            <a:r>
+              <a:rPr lang="en-US" dirty="0">
+                <a:cs typeface="Calibri"/>
+              </a:rPr>
+              <a:t> el </a:t>
+            </a:r>
+            <a:r>
+              <a:rPr lang="en-US" dirty="0" err="1">
+                <a:cs typeface="Calibri"/>
+              </a:rPr>
+              <a:t>nombre</a:t>
+            </a:r>
+            <a:r>
+              <a:rPr lang="en-US" dirty="0">
+                <a:cs typeface="Calibri"/>
+              </a:rPr>
+              <a:t> de las </a:t>
+            </a:r>
+            <a:r>
+              <a:rPr lang="en-US" dirty="0" err="1">
+                <a:cs typeface="Calibri"/>
+              </a:rPr>
+              <a:t>columnas</a:t>
+            </a:r>
+            <a:r>
+              <a:rPr lang="en-US" dirty="0">
+                <a:cs typeface="Calibri"/>
+              </a:rPr>
+              <a:t> de los </a:t>
+            </a:r>
+            <a:r>
+              <a:rPr lang="en-US" dirty="0" err="1">
+                <a:cs typeface="Calibri"/>
+              </a:rPr>
+              <a:t>datos</a:t>
+            </a:r>
+            <a:r>
+              <a:rPr lang="en-US" dirty="0">
+                <a:cs typeface="Calibri"/>
+              </a:rPr>
+              <a:t>, </a:t>
+            </a:r>
+            <a:r>
+              <a:rPr lang="en-US" dirty="0" err="1">
+                <a:cs typeface="Calibri"/>
+              </a:rPr>
+              <a:t>relaciones</a:t>
+            </a:r>
+            <a:r>
+              <a:rPr lang="en-US" dirty="0">
+                <a:cs typeface="Calibri"/>
+              </a:rPr>
+              <a:t> entre </a:t>
+            </a:r>
+            <a:r>
+              <a:rPr lang="en-US" dirty="0" err="1">
+                <a:cs typeface="Calibri"/>
+              </a:rPr>
+              <a:t>ellos</a:t>
+            </a:r>
+            <a:r>
+              <a:rPr lang="en-US" dirty="0">
+                <a:cs typeface="Calibri"/>
+              </a:rPr>
+              <a:t> y con </a:t>
+            </a:r>
+            <a:r>
+              <a:rPr lang="en-US" dirty="0" err="1">
+                <a:cs typeface="Calibri"/>
+              </a:rPr>
+              <a:t>esto</a:t>
+            </a:r>
+            <a:r>
+              <a:rPr lang="en-US" dirty="0">
+                <a:cs typeface="Calibri"/>
+              </a:rPr>
+              <a:t> </a:t>
+            </a:r>
+            <a:r>
+              <a:rPr lang="en-US" dirty="0" err="1">
+                <a:cs typeface="Calibri"/>
+              </a:rPr>
+              <a:t>poder</a:t>
+            </a:r>
+            <a:r>
+              <a:rPr lang="en-US" dirty="0">
+                <a:cs typeface="Calibri"/>
+              </a:rPr>
+              <a:t> </a:t>
+            </a:r>
+            <a:r>
+              <a:rPr lang="en-US" dirty="0" err="1">
+                <a:cs typeface="Calibri"/>
+              </a:rPr>
+              <a:t>calcular</a:t>
+            </a:r>
+            <a:r>
+              <a:rPr lang="en-US" dirty="0">
+                <a:cs typeface="Calibri"/>
+              </a:rPr>
+              <a:t> </a:t>
+            </a:r>
+            <a:r>
+              <a:rPr lang="en-US" dirty="0" err="1">
+                <a:cs typeface="Calibri"/>
+              </a:rPr>
+              <a:t>algunos</a:t>
+            </a:r>
+            <a:r>
+              <a:rPr lang="en-US" dirty="0">
+                <a:cs typeface="Calibri"/>
+              </a:rPr>
+              <a:t> </a:t>
+            </a:r>
+            <a:r>
+              <a:rPr lang="en-US" dirty="0" err="1">
+                <a:cs typeface="Calibri"/>
+              </a:rPr>
+              <a:t>datos</a:t>
+            </a:r>
+            <a:r>
+              <a:rPr lang="en-US" dirty="0">
+                <a:cs typeface="Calibri"/>
+              </a:rPr>
+              <a:t> en base a </a:t>
+            </a:r>
+            <a:r>
+              <a:rPr lang="en-US" dirty="0" err="1">
+                <a:cs typeface="Calibri"/>
+              </a:rPr>
+              <a:t>otros</a:t>
+            </a:r>
+            <a:r>
+              <a:rPr lang="en-US" dirty="0">
+                <a:cs typeface="Calibri"/>
+              </a:rPr>
+              <a:t>.</a:t>
+            </a:r>
+          </a:p>
+          <a:p>
+            <a:r>
+              <a:rPr lang="en-US" dirty="0" err="1">
+                <a:cs typeface="Calibri"/>
+              </a:rPr>
+              <a:t>Asi</a:t>
+            </a:r>
+            <a:r>
+              <a:rPr lang="en-US" dirty="0">
+                <a:cs typeface="Calibri"/>
+              </a:rPr>
+              <a:t> </a:t>
+            </a:r>
+            <a:r>
+              <a:rPr lang="en-US" dirty="0" err="1">
+                <a:cs typeface="Calibri"/>
+              </a:rPr>
+              <a:t>mismo</a:t>
+            </a:r>
+            <a:r>
+              <a:rPr lang="en-US" dirty="0">
+                <a:cs typeface="Calibri"/>
+              </a:rPr>
+              <a:t>, el set de </a:t>
+            </a:r>
+            <a:r>
+              <a:rPr lang="en-US" dirty="0" err="1">
+                <a:cs typeface="Calibri"/>
+              </a:rPr>
+              <a:t>datos</a:t>
+            </a:r>
+            <a:r>
+              <a:rPr lang="en-US" dirty="0">
+                <a:cs typeface="Calibri"/>
+              </a:rPr>
+              <a:t> </a:t>
+            </a:r>
+            <a:r>
+              <a:rPr lang="en-US" dirty="0" err="1">
+                <a:cs typeface="Calibri"/>
+              </a:rPr>
+              <a:t>contaba</a:t>
+            </a:r>
+            <a:r>
+              <a:rPr lang="en-US" dirty="0">
+                <a:cs typeface="Calibri"/>
+              </a:rPr>
+              <a:t> con una </a:t>
+            </a:r>
+            <a:r>
+              <a:rPr lang="en-US" dirty="0" err="1">
+                <a:cs typeface="Calibri"/>
+              </a:rPr>
+              <a:t>columna</a:t>
+            </a:r>
+            <a:r>
+              <a:rPr lang="en-US" dirty="0">
+                <a:cs typeface="Calibri"/>
+              </a:rPr>
+              <a:t> (description) que </a:t>
+            </a:r>
+            <a:r>
+              <a:rPr lang="en-US" dirty="0" err="1">
+                <a:cs typeface="Calibri"/>
+              </a:rPr>
+              <a:t>contenía</a:t>
+            </a:r>
+            <a:r>
+              <a:rPr lang="en-US" dirty="0">
+                <a:cs typeface="Calibri"/>
+              </a:rPr>
+              <a:t> </a:t>
+            </a:r>
+            <a:r>
+              <a:rPr lang="en-US" dirty="0" err="1">
+                <a:cs typeface="Calibri"/>
+              </a:rPr>
+              <a:t>información</a:t>
+            </a:r>
+            <a:r>
+              <a:rPr lang="en-US" dirty="0">
+                <a:cs typeface="Calibri"/>
+              </a:rPr>
+              <a:t> en </a:t>
+            </a:r>
+            <a:r>
+              <a:rPr lang="en-US" dirty="0" err="1">
+                <a:cs typeface="Calibri"/>
+              </a:rPr>
+              <a:t>formato</a:t>
+            </a:r>
+            <a:r>
+              <a:rPr lang="en-US" dirty="0">
+                <a:cs typeface="Calibri"/>
+              </a:rPr>
+              <a:t> de </a:t>
+            </a:r>
+            <a:r>
+              <a:rPr lang="en-US" dirty="0" err="1">
+                <a:cs typeface="Calibri"/>
+              </a:rPr>
+              <a:t>texto</a:t>
+            </a:r>
+            <a:r>
+              <a:rPr lang="en-US" dirty="0">
+                <a:cs typeface="Calibri"/>
+              </a:rPr>
+              <a:t> del </a:t>
+            </a:r>
+            <a:r>
+              <a:rPr lang="en-US" dirty="0" err="1">
+                <a:cs typeface="Calibri"/>
+              </a:rPr>
+              <a:t>cuál</a:t>
+            </a:r>
+            <a:r>
+              <a:rPr lang="en-US" dirty="0">
+                <a:cs typeface="Calibri"/>
+              </a:rPr>
+              <a:t> se </a:t>
+            </a:r>
+            <a:r>
+              <a:rPr lang="en-US" dirty="0" err="1">
+                <a:cs typeface="Calibri"/>
+              </a:rPr>
+              <a:t>podía</a:t>
+            </a:r>
+            <a:r>
+              <a:rPr lang="en-US" dirty="0">
+                <a:cs typeface="Calibri"/>
+              </a:rPr>
+              <a:t> </a:t>
+            </a:r>
+            <a:r>
+              <a:rPr lang="en-US" dirty="0" err="1">
+                <a:cs typeface="Calibri"/>
+              </a:rPr>
+              <a:t>utilizar</a:t>
+            </a:r>
+            <a:r>
+              <a:rPr lang="en-US" dirty="0">
+                <a:cs typeface="Calibri"/>
+              </a:rPr>
+              <a:t> para </a:t>
+            </a:r>
+            <a:r>
+              <a:rPr lang="en-US" dirty="0" err="1">
+                <a:cs typeface="Calibri"/>
+              </a:rPr>
+              <a:t>inferir</a:t>
+            </a:r>
+            <a:r>
+              <a:rPr lang="en-US" dirty="0">
+                <a:cs typeface="Calibri"/>
+              </a:rPr>
+              <a:t> </a:t>
+            </a:r>
+            <a:r>
+              <a:rPr lang="en-US" dirty="0" err="1">
+                <a:cs typeface="Calibri"/>
+              </a:rPr>
+              <a:t>otros</a:t>
+            </a:r>
+            <a:r>
+              <a:rPr lang="en-US" dirty="0">
+                <a:cs typeface="Calibri"/>
+              </a:rPr>
+              <a:t> </a:t>
+            </a:r>
+            <a:r>
+              <a:rPr lang="en-US" dirty="0" err="1">
+                <a:cs typeface="Calibri"/>
+              </a:rPr>
+              <a:t>datos</a:t>
+            </a:r>
+            <a:r>
+              <a:rPr lang="en-US" dirty="0">
+                <a:cs typeface="Calibri"/>
+              </a:rPr>
+              <a:t>.</a:t>
+            </a:r>
           </a:p>
         </p:txBody>
       </p:sp>
     </p:spTree>
     <p:extLst>
       <p:ext uri="{BB962C8B-B14F-4D97-AF65-F5344CB8AC3E}">
-        <p14:creationId xmlns:p14="http://schemas.microsoft.com/office/powerpoint/2010/main" val="3372295044"/>
+        <p14:creationId xmlns:p14="http://schemas.microsoft.com/office/powerpoint/2010/main" val="1840946815"/>
       </p:ext>
     </p:extLst>
   </p:cSld>

</xml_diff>